<commit_message>
add insert composite key test case
</commit_message>
<xml_diff>
--- a/Dapper.pptx
+++ b/Dapper.pptx
@@ -123,7 +123,7 @@
   </p:defaultTextStyle>
   <p:extLst>
     <p:ext uri="{EFAFB233-063F-42B5-8137-9DF3F51BA10A}">
-      <p15:sldGuideLst xmlns="" xmlns:p15="http://schemas.microsoft.com/office/powerpoint/2012/main">
+      <p15:sldGuideLst xmlns:p15="http://schemas.microsoft.com/office/powerpoint/2012/main" xmlns="">
         <p15:guide id="1" orient="horz" pos="2160">
           <p15:clr>
             <a:srgbClr val="A4A3A4"/>
@@ -222,7 +222,7 @@
           <a:p>
             <a:fld id="{ACCAADC0-F719-458B-806E-BB661BCF77D7}" type="datetimeFigureOut">
               <a:rPr lang="zh-TW" altLang="en-US" smtClean="0"/>
-              <a:t>2018/4/19</a:t>
+              <a:t>2018/4/21</a:t>
             </a:fld>
             <a:endParaRPr lang="zh-TW" altLang="en-US"/>
           </a:p>
@@ -617,6 +617,12 @@
         <p:txBody>
           <a:bodyPr/>
           <a:lstStyle/>
+          <a:p>
+            <a:r>
+              <a:rPr lang="en-US" altLang="zh-TW" smtClean="0"/>
+              <a:t>https://docs.microsoft.com/en-us/dotnet/framework/data/adonet/ef/overview</a:t>
+            </a:r>
+          </a:p>
           <a:p>
             <a:endParaRPr lang="zh-TW" altLang="en-US" dirty="0"/>
           </a:p>
@@ -1455,7 +1461,7 @@
           <a:p>
             <a:fld id="{C018CCD3-627B-468E-B64C-BDCCDCEFD60D}" type="datetimeFigureOut">
               <a:rPr lang="zh-TW" altLang="en-US" smtClean="0"/>
-              <a:t>2018/4/19</a:t>
+              <a:t>2018/4/21</a:t>
             </a:fld>
             <a:endParaRPr lang="zh-TW" altLang="en-US"/>
           </a:p>
@@ -1706,7 +1712,7 @@
           <a:p>
             <a:fld id="{C018CCD3-627B-468E-B64C-BDCCDCEFD60D}" type="datetimeFigureOut">
               <a:rPr lang="zh-TW" altLang="en-US" smtClean="0"/>
-              <a:t>2018/4/19</a:t>
+              <a:t>2018/4/21</a:t>
             </a:fld>
             <a:endParaRPr lang="zh-TW" altLang="en-US"/>
           </a:p>
@@ -2020,7 +2026,7 @@
           <a:p>
             <a:fld id="{C018CCD3-627B-468E-B64C-BDCCDCEFD60D}" type="datetimeFigureOut">
               <a:rPr lang="zh-TW" altLang="en-US" smtClean="0"/>
-              <a:t>2018/4/19</a:t>
+              <a:t>2018/4/21</a:t>
             </a:fld>
             <a:endParaRPr lang="zh-TW" altLang="en-US"/>
           </a:p>
@@ -2347,7 +2353,7 @@
           <a:p>
             <a:fld id="{C018CCD3-627B-468E-B64C-BDCCDCEFD60D}" type="datetimeFigureOut">
               <a:rPr lang="zh-TW" altLang="en-US" smtClean="0"/>
-              <a:t>2018/4/19</a:t>
+              <a:t>2018/4/21</a:t>
             </a:fld>
             <a:endParaRPr lang="zh-TW" altLang="en-US"/>
           </a:p>
@@ -2661,7 +2667,7 @@
           <a:p>
             <a:fld id="{C018CCD3-627B-468E-B64C-BDCCDCEFD60D}" type="datetimeFigureOut">
               <a:rPr lang="zh-TW" altLang="en-US" smtClean="0"/>
-              <a:t>2018/4/19</a:t>
+              <a:t>2018/4/21</a:t>
             </a:fld>
             <a:endParaRPr lang="zh-TW" altLang="en-US"/>
           </a:p>
@@ -3048,7 +3054,7 @@
           <a:p>
             <a:fld id="{C018CCD3-627B-468E-B64C-BDCCDCEFD60D}" type="datetimeFigureOut">
               <a:rPr lang="zh-TW" altLang="en-US" smtClean="0"/>
-              <a:t>2018/4/19</a:t>
+              <a:t>2018/4/21</a:t>
             </a:fld>
             <a:endParaRPr lang="zh-TW" altLang="en-US"/>
           </a:p>
@@ -3218,7 +3224,7 @@
           <a:p>
             <a:fld id="{C018CCD3-627B-468E-B64C-BDCCDCEFD60D}" type="datetimeFigureOut">
               <a:rPr lang="zh-TW" altLang="en-US" smtClean="0"/>
-              <a:t>2018/4/19</a:t>
+              <a:t>2018/4/21</a:t>
             </a:fld>
             <a:endParaRPr lang="zh-TW" altLang="en-US"/>
           </a:p>
@@ -3398,7 +3404,7 @@
           <a:p>
             <a:fld id="{C018CCD3-627B-468E-B64C-BDCCDCEFD60D}" type="datetimeFigureOut">
               <a:rPr lang="zh-TW" altLang="en-US" smtClean="0"/>
-              <a:t>2018/4/19</a:t>
+              <a:t>2018/4/21</a:t>
             </a:fld>
             <a:endParaRPr lang="zh-TW" altLang="en-US"/>
           </a:p>
@@ -3574,7 +3580,7 @@
           <a:p>
             <a:fld id="{C018CCD3-627B-468E-B64C-BDCCDCEFD60D}" type="datetimeFigureOut">
               <a:rPr lang="zh-TW" altLang="en-US" smtClean="0"/>
-              <a:t>2018/4/19</a:t>
+              <a:t>2018/4/21</a:t>
             </a:fld>
             <a:endParaRPr lang="zh-TW" altLang="en-US"/>
           </a:p>
@@ -3818,7 +3824,7 @@
           <a:p>
             <a:fld id="{C018CCD3-627B-468E-B64C-BDCCDCEFD60D}" type="datetimeFigureOut">
               <a:rPr lang="zh-TW" altLang="en-US" smtClean="0"/>
-              <a:t>2018/4/19</a:t>
+              <a:t>2018/4/21</a:t>
             </a:fld>
             <a:endParaRPr lang="zh-TW" altLang="en-US"/>
           </a:p>
@@ -4115,7 +4121,7 @@
           <a:p>
             <a:fld id="{C018CCD3-627B-468E-B64C-BDCCDCEFD60D}" type="datetimeFigureOut">
               <a:rPr lang="zh-TW" altLang="en-US" smtClean="0"/>
-              <a:t>2018/4/19</a:t>
+              <a:t>2018/4/21</a:t>
             </a:fld>
             <a:endParaRPr lang="zh-TW" altLang="en-US"/>
           </a:p>
@@ -4494,7 +4500,7 @@
           <a:p>
             <a:fld id="{C018CCD3-627B-468E-B64C-BDCCDCEFD60D}" type="datetimeFigureOut">
               <a:rPr lang="zh-TW" altLang="en-US" smtClean="0"/>
-              <a:t>2018/4/19</a:t>
+              <a:t>2018/4/21</a:t>
             </a:fld>
             <a:endParaRPr lang="zh-TW" altLang="en-US"/>
           </a:p>
@@ -4617,7 +4623,7 @@
           <a:p>
             <a:fld id="{C018CCD3-627B-468E-B64C-BDCCDCEFD60D}" type="datetimeFigureOut">
               <a:rPr lang="zh-TW" altLang="en-US" smtClean="0"/>
-              <a:t>2018/4/19</a:t>
+              <a:t>2018/4/21</a:t>
             </a:fld>
             <a:endParaRPr lang="zh-TW" altLang="en-US"/>
           </a:p>
@@ -4712,7 +4718,7 @@
           <a:p>
             <a:fld id="{C018CCD3-627B-468E-B64C-BDCCDCEFD60D}" type="datetimeFigureOut">
               <a:rPr lang="zh-TW" altLang="en-US" smtClean="0"/>
-              <a:t>2018/4/19</a:t>
+              <a:t>2018/4/21</a:t>
             </a:fld>
             <a:endParaRPr lang="zh-TW" altLang="en-US"/>
           </a:p>
@@ -4967,7 +4973,7 @@
           <a:p>
             <a:fld id="{C018CCD3-627B-468E-B64C-BDCCDCEFD60D}" type="datetimeFigureOut">
               <a:rPr lang="zh-TW" altLang="en-US" smtClean="0"/>
-              <a:t>2018/4/19</a:t>
+              <a:t>2018/4/21</a:t>
             </a:fld>
             <a:endParaRPr lang="zh-TW" altLang="en-US"/>
           </a:p>
@@ -5230,7 +5236,7 @@
           <a:p>
             <a:fld id="{C018CCD3-627B-468E-B64C-BDCCDCEFD60D}" type="datetimeFigureOut">
               <a:rPr lang="zh-TW" altLang="en-US" smtClean="0"/>
-              <a:t>2018/4/19</a:t>
+              <a:t>2018/4/21</a:t>
             </a:fld>
             <a:endParaRPr lang="zh-TW" altLang="en-US"/>
           </a:p>
@@ -6046,7 +6052,7 @@
           <a:p>
             <a:fld id="{C018CCD3-627B-468E-B64C-BDCCDCEFD60D}" type="datetimeFigureOut">
               <a:rPr lang="zh-TW" altLang="en-US" smtClean="0"/>
-              <a:t>2018/4/19</a:t>
+              <a:t>2018/4/21</a:t>
             </a:fld>
             <a:endParaRPr lang="zh-TW" altLang="en-US"/>
           </a:p>
@@ -7415,161 +7421,181 @@
           <a:lstStyle/>
           <a:p>
             <a:r>
-              <a:rPr lang="en-US" altLang="zh-TW" sz="1600" dirty="0" smtClean="0"/>
+              <a:rPr lang="en-US" altLang="zh-TW" sz="1300" dirty="0" smtClean="0"/>
               <a:t>Table</a:t>
             </a:r>
           </a:p>
           <a:p>
             <a:pPr lvl="1"/>
             <a:r>
-              <a:rPr lang="zh-TW" altLang="en-US" sz="1400" dirty="0" smtClean="0"/>
+              <a:rPr lang="zh-TW" altLang="en-US" sz="1300" dirty="0" smtClean="0"/>
               <a:t>指定</a:t>
             </a:r>
             <a:r>
-              <a:rPr lang="en-US" altLang="zh-TW" sz="1400" dirty="0"/>
+              <a:rPr lang="en-US" altLang="zh-TW" sz="1300" dirty="0"/>
               <a:t> </a:t>
             </a:r>
             <a:r>
-              <a:rPr lang="en-US" altLang="zh-TW" sz="1400" dirty="0" smtClean="0"/>
+              <a:rPr lang="en-US" altLang="zh-TW" sz="1300" dirty="0" smtClean="0"/>
               <a:t>Table </a:t>
             </a:r>
             <a:r>
-              <a:rPr lang="zh-TW" altLang="en-US" sz="1400" dirty="0" smtClean="0"/>
+              <a:rPr lang="zh-TW" altLang="en-US" sz="1300" dirty="0" smtClean="0"/>
               <a:t>名稱</a:t>
             </a:r>
-            <a:endParaRPr lang="en-US" altLang="zh-TW" sz="1400" dirty="0" smtClean="0"/>
-          </a:p>
-          <a:p>
-            <a:r>
-              <a:rPr lang="en-US" altLang="zh-TW" sz="1600" dirty="0" smtClean="0"/>
+            <a:endParaRPr lang="en-US" altLang="zh-TW" sz="1300" dirty="0" smtClean="0"/>
+          </a:p>
+          <a:p>
+            <a:r>
+              <a:rPr lang="en-US" altLang="zh-TW" sz="1300" dirty="0" smtClean="0"/>
               <a:t>Key</a:t>
             </a:r>
           </a:p>
           <a:p>
             <a:pPr lvl="1"/>
             <a:r>
-              <a:rPr lang="zh-TW" altLang="en-US" sz="1400" dirty="0" smtClean="0"/>
+              <a:rPr lang="zh-TW" altLang="en-US" sz="1300" dirty="0" smtClean="0"/>
               <a:t>標記此屬性為</a:t>
             </a:r>
             <a:r>
-              <a:rPr lang="en-US" altLang="zh-TW" sz="1400" dirty="0" smtClean="0"/>
+              <a:rPr lang="en-US" altLang="zh-TW" sz="1300" dirty="0" smtClean="0"/>
               <a:t> PK , </a:t>
             </a:r>
             <a:r>
-              <a:rPr lang="zh-TW" altLang="en-US" sz="1400" dirty="0" smtClean="0"/>
-              <a:t>並會使用資料庫自動編號</a:t>
-            </a:r>
-            <a:endParaRPr lang="en-US" altLang="zh-TW" sz="1400" dirty="0" smtClean="0"/>
-          </a:p>
-          <a:p>
-            <a:r>
-              <a:rPr lang="en-US" altLang="zh-TW" sz="1600" dirty="0" err="1" smtClean="0"/>
+              <a:rPr lang="zh-TW" altLang="en-US" sz="1300" dirty="0" smtClean="0"/>
+              <a:t>並會使用資料庫自動</a:t>
+            </a:r>
+            <a:r>
+              <a:rPr lang="zh-TW" altLang="en-US" sz="1300" dirty="0" smtClean="0"/>
+              <a:t>編號</a:t>
+            </a:r>
+            <a:r>
+              <a:rPr lang="en-US" altLang="zh-TW" sz="1300" dirty="0" smtClean="0"/>
+              <a:t>, </a:t>
+            </a:r>
+            <a:r>
+              <a:rPr lang="zh-TW" altLang="en-US" sz="1300" dirty="0" smtClean="0"/>
+              <a:t>故</a:t>
+            </a:r>
+            <a:r>
+              <a:rPr lang="en-US" altLang="zh-TW" sz="1300" dirty="0" smtClean="0"/>
+              <a:t>Insert()</a:t>
+            </a:r>
+            <a:r>
+              <a:rPr lang="zh-TW" altLang="en-US" sz="1300" dirty="0" smtClean="0"/>
+              <a:t>不會包含此欄位</a:t>
+            </a:r>
+            <a:endParaRPr lang="en-US" altLang="zh-TW" sz="1300" dirty="0" smtClean="0"/>
+          </a:p>
+          <a:p>
+            <a:r>
+              <a:rPr lang="en-US" altLang="zh-TW" sz="1300" dirty="0" err="1" smtClean="0"/>
               <a:t>ExplicitKey</a:t>
             </a:r>
-            <a:endParaRPr lang="en-US" altLang="zh-TW" sz="1600" dirty="0" smtClean="0"/>
+            <a:endParaRPr lang="en-US" altLang="zh-TW" sz="1300" dirty="0" smtClean="0"/>
           </a:p>
           <a:p>
             <a:pPr lvl="1"/>
             <a:r>
-              <a:rPr lang="zh-TW" altLang="en-US" sz="1400" dirty="0" smtClean="0"/>
+              <a:rPr lang="zh-TW" altLang="en-US" sz="1300" dirty="0" smtClean="0"/>
               <a:t>標記此屬性為</a:t>
             </a:r>
             <a:r>
-              <a:rPr lang="en-US" altLang="zh-TW" sz="1400" dirty="0" smtClean="0"/>
+              <a:rPr lang="en-US" altLang="zh-TW" sz="1300" dirty="0" smtClean="0"/>
               <a:t> PK , </a:t>
             </a:r>
             <a:r>
-              <a:rPr lang="zh-TW" altLang="en-US" sz="1400" dirty="0" smtClean="0"/>
+              <a:rPr lang="zh-TW" altLang="en-US" sz="1300" dirty="0" smtClean="0"/>
               <a:t>但不使用資料庫自動編號</a:t>
             </a:r>
             <a:r>
-              <a:rPr lang="en-US" altLang="zh-TW" sz="1400" dirty="0" smtClean="0"/>
+              <a:rPr lang="en-US" altLang="zh-TW" sz="1300" dirty="0" smtClean="0"/>
               <a:t>, </a:t>
             </a:r>
             <a:r>
-              <a:rPr lang="zh-TW" altLang="en-US" sz="1400" dirty="0" smtClean="0"/>
+              <a:rPr lang="zh-TW" altLang="en-US" sz="1300" dirty="0" smtClean="0"/>
               <a:t>會由程式賦予值</a:t>
             </a:r>
-            <a:endParaRPr lang="en-US" altLang="zh-TW" sz="1400" dirty="0" smtClean="0"/>
-          </a:p>
-          <a:p>
-            <a:r>
-              <a:rPr lang="en-US" altLang="zh-TW" sz="1600" dirty="0" smtClean="0"/>
+            <a:endParaRPr lang="en-US" altLang="zh-TW" sz="1300" dirty="0" smtClean="0"/>
+          </a:p>
+          <a:p>
+            <a:r>
+              <a:rPr lang="en-US" altLang="zh-TW" sz="1300" dirty="0" smtClean="0"/>
               <a:t>Write</a:t>
             </a:r>
           </a:p>
           <a:p>
             <a:pPr lvl="1"/>
             <a:r>
-              <a:rPr lang="zh-TW" altLang="en-US" sz="1400" dirty="0" smtClean="0"/>
+              <a:rPr lang="zh-TW" altLang="en-US" sz="1300" dirty="0" smtClean="0"/>
               <a:t>標記此屬性不寫入資料庫</a:t>
             </a:r>
-            <a:endParaRPr lang="en-US" altLang="zh-TW" sz="1400" dirty="0"/>
+            <a:endParaRPr lang="en-US" altLang="zh-TW" sz="1300" dirty="0"/>
           </a:p>
           <a:p>
             <a:pPr lvl="1"/>
             <a:r>
-              <a:rPr lang="zh-TW" altLang="en-US" sz="1400" dirty="0" smtClean="0"/>
+              <a:rPr lang="zh-TW" altLang="en-US" sz="1300" dirty="0" smtClean="0"/>
               <a:t>為 </a:t>
             </a:r>
             <a:r>
-              <a:rPr lang="en-US" altLang="zh-TW" sz="1400" dirty="0" smtClean="0"/>
+              <a:rPr lang="en-US" altLang="zh-TW" sz="1300" dirty="0" smtClean="0"/>
               <a:t>false </a:t>
             </a:r>
             <a:r>
-              <a:rPr lang="zh-TW" altLang="en-US" sz="1400" dirty="0" smtClean="0"/>
+              <a:rPr lang="zh-TW" altLang="en-US" sz="1300" dirty="0" smtClean="0"/>
               <a:t>時不會被存入</a:t>
             </a:r>
             <a:r>
-              <a:rPr lang="en-US" altLang="zh-TW" sz="1400" dirty="0" smtClean="0"/>
+              <a:rPr lang="en-US" altLang="zh-TW" sz="1300" dirty="0" smtClean="0"/>
               <a:t> Dapper cache</a:t>
             </a:r>
           </a:p>
           <a:p>
             <a:r>
-              <a:rPr lang="en-US" altLang="zh-TW" sz="1600" dirty="0" smtClean="0"/>
+              <a:rPr lang="en-US" altLang="zh-TW" sz="1300" dirty="0" smtClean="0"/>
               <a:t>Computed</a:t>
             </a:r>
           </a:p>
           <a:p>
             <a:pPr lvl="1"/>
             <a:r>
-              <a:rPr lang="zh-TW" altLang="en-US" sz="1400" dirty="0" smtClean="0"/>
+              <a:rPr lang="zh-TW" altLang="en-US" sz="1300" dirty="0" smtClean="0"/>
               <a:t>標記此屬性為計算出來的屬性，不寫入資料庫</a:t>
             </a:r>
-            <a:endParaRPr lang="en-US" altLang="zh-TW" sz="1400" dirty="0" smtClean="0"/>
+            <a:endParaRPr lang="en-US" altLang="zh-TW" sz="1300" dirty="0" smtClean="0"/>
           </a:p>
           <a:p>
             <a:pPr marL="514350" lvl="1" indent="0">
               <a:buNone/>
             </a:pPr>
-            <a:endParaRPr lang="en-US" altLang="zh-TW" sz="1400" dirty="0" smtClean="0"/>
+            <a:endParaRPr lang="en-US" altLang="zh-TW" sz="1300" dirty="0" smtClean="0"/>
           </a:p>
           <a:p>
             <a:pPr marL="514350" lvl="1" indent="0">
               <a:buNone/>
             </a:pPr>
             <a:r>
-              <a:rPr lang="zh-TW" altLang="en-US" b="1" dirty="0" smtClean="0"/>
+              <a:rPr lang="zh-TW" altLang="en-US" sz="1300" b="1" dirty="0" smtClean="0"/>
               <a:t>注意</a:t>
             </a:r>
             <a:r>
-              <a:rPr lang="en-US" altLang="zh-TW" b="1" dirty="0" smtClean="0"/>
+              <a:rPr lang="en-US" altLang="zh-TW" sz="1300" b="1" dirty="0" smtClean="0"/>
               <a:t> namespace </a:t>
             </a:r>
             <a:r>
-              <a:rPr lang="zh-TW" altLang="en-US" b="1" dirty="0" smtClean="0"/>
+              <a:rPr lang="zh-TW" altLang="en-US" sz="1300" b="1" dirty="0" smtClean="0"/>
               <a:t>是 </a:t>
             </a:r>
             <a:r>
-              <a:rPr lang="en-US" altLang="zh-TW" b="1" dirty="0" err="1" smtClean="0"/>
+              <a:rPr lang="en-US" altLang="zh-TW" sz="1300" b="1" dirty="0" err="1" smtClean="0"/>
               <a:t>Dapper.Contrib.Extensions</a:t>
             </a:r>
             <a:r>
-              <a:rPr lang="en-US" altLang="zh-TW" b="1" dirty="0" smtClean="0"/>
+              <a:rPr lang="en-US" altLang="zh-TW" sz="1300" b="1" dirty="0" smtClean="0"/>
               <a:t>;</a:t>
             </a:r>
-            <a:endParaRPr lang="en-US" altLang="zh-TW" sz="1400" b="1" dirty="0"/>
+            <a:endParaRPr lang="en-US" altLang="zh-TW" sz="1300" b="1" dirty="0"/>
           </a:p>
         </p:txBody>
       </p:sp>
@@ -7710,19 +7736,11 @@
             </a:r>
             <a:r>
               <a:rPr lang="en-US" altLang="zh-TW" b="1" dirty="0" smtClean="0"/>
-              <a:t> or </a:t>
-            </a:r>
-            <a:r>
-              <a:rPr lang="en-US" altLang="zh-TW" dirty="0" err="1" smtClean="0"/>
-              <a:t>ExplicitKey</a:t>
-            </a:r>
-            <a:r>
-              <a:rPr lang="en-US" altLang="zh-TW" b="1" dirty="0" err="1" smtClean="0"/>
-              <a:t>Attribute</a:t>
+              <a:t> </a:t>
             </a:r>
             <a:r>
               <a:rPr lang="en-US" altLang="zh-TW" b="1" dirty="0" smtClean="0"/>
-              <a:t> found</a:t>
+              <a:t>found</a:t>
             </a:r>
           </a:p>
           <a:p>
@@ -7738,6 +7756,29 @@
             <a:r>
               <a:rPr lang="en-US" altLang="zh-TW" b="1" dirty="0" smtClean="0"/>
               <a:t>)</a:t>
+            </a:r>
+          </a:p>
+          <a:p>
+            <a:pPr lvl="1"/>
+            <a:r>
+              <a:rPr lang="zh-TW" altLang="en-US" b="1" dirty="0"/>
+              <a:t>將</a:t>
+            </a:r>
+            <a:r>
+              <a:rPr lang="zh-TW" altLang="en-US" b="1" dirty="0" smtClean="0"/>
+              <a:t>此 </a:t>
+            </a:r>
+            <a:r>
+              <a:rPr lang="en-US" altLang="zh-TW" b="1" dirty="0" smtClean="0"/>
+              <a:t>id property </a:t>
+            </a:r>
+            <a:r>
+              <a:rPr lang="zh-TW" altLang="en-US" b="1" dirty="0" smtClean="0"/>
+              <a:t>視為 </a:t>
+            </a:r>
+            <a:r>
+              <a:rPr lang="en-US" altLang="zh-TW" b="1" dirty="0" smtClean="0"/>
+              <a:t>[Key]</a:t>
             </a:r>
             <a:endParaRPr lang="en-US" altLang="zh-TW" b="1" dirty="0"/>
           </a:p>
@@ -9058,8 +9099,13 @@
             </a:r>
             <a:r>
               <a:rPr lang="en-US" altLang="zh-TW" dirty="0" smtClean="0"/>
-              <a:t>PK</a:t>
-            </a:r>
+              <a:t>PK </a:t>
+            </a:r>
+            <a:r>
+              <a:rPr lang="zh-TW" altLang="en-US" dirty="0" smtClean="0"/>
+              <a:t>欄位</a:t>
+            </a:r>
+            <a:endParaRPr lang="en-US" altLang="zh-TW" dirty="0" smtClean="0"/>
           </a:p>
           <a:p>
             <a:pPr lvl="1"/>
@@ -9692,7 +9738,7 @@
   <a:extraClrSchemeLst/>
   <a:extLst>
     <a:ext uri="{05A4C25C-085E-4340-85A3-A5531E510DB2}">
-      <thm15:themeFamily xmlns="" xmlns:thm15="http://schemas.microsoft.com/office/thememl/2012/main" name="Facet" id="{C0C680CD-088A-49FC-A102-D699147F32B2}" vid="{8C59B386-999D-4CB6-B907-9F3997C027CC}"/>
+      <thm15:themeFamily xmlns:thm15="http://schemas.microsoft.com/office/thememl/2012/main" xmlns="" name="Facet" id="{C0C680CD-088A-49FC-A102-D699147F32B2}" vid="{8C59B386-999D-4CB6-B907-9F3997C027CC}"/>
     </a:ext>
   </a:extLst>
 </a:theme>

</xml_diff>

<commit_message>
add insert and update benchmark
</commit_message>
<xml_diff>
--- a/Dapper.pptx
+++ b/Dapper.pptx
@@ -5,7 +5,7 @@
     <p:sldMasterId id="2147483677" r:id="rId1"/>
   </p:sldMasterIdLst>
   <p:notesMasterIdLst>
-    <p:notesMasterId r:id="rId17"/>
+    <p:notesMasterId r:id="rId19"/>
   </p:notesMasterIdLst>
   <p:sldIdLst>
     <p:sldId id="256" r:id="rId2"/>
@@ -22,7 +22,9 @@
     <p:sldId id="281" r:id="rId13"/>
     <p:sldId id="279" r:id="rId14"/>
     <p:sldId id="282" r:id="rId15"/>
-    <p:sldId id="277" r:id="rId16"/>
+    <p:sldId id="285" r:id="rId16"/>
+    <p:sldId id="284" r:id="rId17"/>
+    <p:sldId id="277" r:id="rId18"/>
   </p:sldIdLst>
   <p:sldSz cx="9144000" cy="6858000" type="screen4x3"/>
   <p:notesSz cx="6858000" cy="9144000"/>
@@ -123,7 +125,7 @@
   </p:defaultTextStyle>
   <p:extLst>
     <p:ext uri="{EFAFB233-063F-42B5-8137-9DF3F51BA10A}">
-      <p15:sldGuideLst xmlns:p15="http://schemas.microsoft.com/office/powerpoint/2012/main" xmlns="">
+      <p15:sldGuideLst xmlns="" xmlns:p15="http://schemas.microsoft.com/office/powerpoint/2012/main">
         <p15:guide id="1" orient="horz" pos="2160">
           <p15:clr>
             <a:srgbClr val="A4A3A4"/>
@@ -222,7 +224,7 @@
           <a:p>
             <a:fld id="{ACCAADC0-F719-458B-806E-BB661BCF77D7}" type="datetimeFigureOut">
               <a:rPr lang="zh-TW" altLang="en-US" smtClean="0"/>
-              <a:t>2018/4/21</a:t>
+              <a:t>2018/4/25</a:t>
             </a:fld>
             <a:endParaRPr lang="zh-TW" altLang="en-US"/>
           </a:p>
@@ -1461,7 +1463,7 @@
           <a:p>
             <a:fld id="{C018CCD3-627B-468E-B64C-BDCCDCEFD60D}" type="datetimeFigureOut">
               <a:rPr lang="zh-TW" altLang="en-US" smtClean="0"/>
-              <a:t>2018/4/21</a:t>
+              <a:t>2018/4/25</a:t>
             </a:fld>
             <a:endParaRPr lang="zh-TW" altLang="en-US"/>
           </a:p>
@@ -1712,7 +1714,7 @@
           <a:p>
             <a:fld id="{C018CCD3-627B-468E-B64C-BDCCDCEFD60D}" type="datetimeFigureOut">
               <a:rPr lang="zh-TW" altLang="en-US" smtClean="0"/>
-              <a:t>2018/4/21</a:t>
+              <a:t>2018/4/25</a:t>
             </a:fld>
             <a:endParaRPr lang="zh-TW" altLang="en-US"/>
           </a:p>
@@ -2026,7 +2028,7 @@
           <a:p>
             <a:fld id="{C018CCD3-627B-468E-B64C-BDCCDCEFD60D}" type="datetimeFigureOut">
               <a:rPr lang="zh-TW" altLang="en-US" smtClean="0"/>
-              <a:t>2018/4/21</a:t>
+              <a:t>2018/4/25</a:t>
             </a:fld>
             <a:endParaRPr lang="zh-TW" altLang="en-US"/>
           </a:p>
@@ -2353,7 +2355,7 @@
           <a:p>
             <a:fld id="{C018CCD3-627B-468E-B64C-BDCCDCEFD60D}" type="datetimeFigureOut">
               <a:rPr lang="zh-TW" altLang="en-US" smtClean="0"/>
-              <a:t>2018/4/21</a:t>
+              <a:t>2018/4/25</a:t>
             </a:fld>
             <a:endParaRPr lang="zh-TW" altLang="en-US"/>
           </a:p>
@@ -2667,7 +2669,7 @@
           <a:p>
             <a:fld id="{C018CCD3-627B-468E-B64C-BDCCDCEFD60D}" type="datetimeFigureOut">
               <a:rPr lang="zh-TW" altLang="en-US" smtClean="0"/>
-              <a:t>2018/4/21</a:t>
+              <a:t>2018/4/25</a:t>
             </a:fld>
             <a:endParaRPr lang="zh-TW" altLang="en-US"/>
           </a:p>
@@ -3054,7 +3056,7 @@
           <a:p>
             <a:fld id="{C018CCD3-627B-468E-B64C-BDCCDCEFD60D}" type="datetimeFigureOut">
               <a:rPr lang="zh-TW" altLang="en-US" smtClean="0"/>
-              <a:t>2018/4/21</a:t>
+              <a:t>2018/4/25</a:t>
             </a:fld>
             <a:endParaRPr lang="zh-TW" altLang="en-US"/>
           </a:p>
@@ -3224,7 +3226,7 @@
           <a:p>
             <a:fld id="{C018CCD3-627B-468E-B64C-BDCCDCEFD60D}" type="datetimeFigureOut">
               <a:rPr lang="zh-TW" altLang="en-US" smtClean="0"/>
-              <a:t>2018/4/21</a:t>
+              <a:t>2018/4/25</a:t>
             </a:fld>
             <a:endParaRPr lang="zh-TW" altLang="en-US"/>
           </a:p>
@@ -3404,7 +3406,7 @@
           <a:p>
             <a:fld id="{C018CCD3-627B-468E-B64C-BDCCDCEFD60D}" type="datetimeFigureOut">
               <a:rPr lang="zh-TW" altLang="en-US" smtClean="0"/>
-              <a:t>2018/4/21</a:t>
+              <a:t>2018/4/25</a:t>
             </a:fld>
             <a:endParaRPr lang="zh-TW" altLang="en-US"/>
           </a:p>
@@ -3580,7 +3582,7 @@
           <a:p>
             <a:fld id="{C018CCD3-627B-468E-B64C-BDCCDCEFD60D}" type="datetimeFigureOut">
               <a:rPr lang="zh-TW" altLang="en-US" smtClean="0"/>
-              <a:t>2018/4/21</a:t>
+              <a:t>2018/4/25</a:t>
             </a:fld>
             <a:endParaRPr lang="zh-TW" altLang="en-US"/>
           </a:p>
@@ -3824,7 +3826,7 @@
           <a:p>
             <a:fld id="{C018CCD3-627B-468E-B64C-BDCCDCEFD60D}" type="datetimeFigureOut">
               <a:rPr lang="zh-TW" altLang="en-US" smtClean="0"/>
-              <a:t>2018/4/21</a:t>
+              <a:t>2018/4/25</a:t>
             </a:fld>
             <a:endParaRPr lang="zh-TW" altLang="en-US"/>
           </a:p>
@@ -4121,7 +4123,7 @@
           <a:p>
             <a:fld id="{C018CCD3-627B-468E-B64C-BDCCDCEFD60D}" type="datetimeFigureOut">
               <a:rPr lang="zh-TW" altLang="en-US" smtClean="0"/>
-              <a:t>2018/4/21</a:t>
+              <a:t>2018/4/25</a:t>
             </a:fld>
             <a:endParaRPr lang="zh-TW" altLang="en-US"/>
           </a:p>
@@ -4500,7 +4502,7 @@
           <a:p>
             <a:fld id="{C018CCD3-627B-468E-B64C-BDCCDCEFD60D}" type="datetimeFigureOut">
               <a:rPr lang="zh-TW" altLang="en-US" smtClean="0"/>
-              <a:t>2018/4/21</a:t>
+              <a:t>2018/4/25</a:t>
             </a:fld>
             <a:endParaRPr lang="zh-TW" altLang="en-US"/>
           </a:p>
@@ -4623,7 +4625,7 @@
           <a:p>
             <a:fld id="{C018CCD3-627B-468E-B64C-BDCCDCEFD60D}" type="datetimeFigureOut">
               <a:rPr lang="zh-TW" altLang="en-US" smtClean="0"/>
-              <a:t>2018/4/21</a:t>
+              <a:t>2018/4/25</a:t>
             </a:fld>
             <a:endParaRPr lang="zh-TW" altLang="en-US"/>
           </a:p>
@@ -4718,7 +4720,7 @@
           <a:p>
             <a:fld id="{C018CCD3-627B-468E-B64C-BDCCDCEFD60D}" type="datetimeFigureOut">
               <a:rPr lang="zh-TW" altLang="en-US" smtClean="0"/>
-              <a:t>2018/4/21</a:t>
+              <a:t>2018/4/25</a:t>
             </a:fld>
             <a:endParaRPr lang="zh-TW" altLang="en-US"/>
           </a:p>
@@ -4973,7 +4975,7 @@
           <a:p>
             <a:fld id="{C018CCD3-627B-468E-B64C-BDCCDCEFD60D}" type="datetimeFigureOut">
               <a:rPr lang="zh-TW" altLang="en-US" smtClean="0"/>
-              <a:t>2018/4/21</a:t>
+              <a:t>2018/4/25</a:t>
             </a:fld>
             <a:endParaRPr lang="zh-TW" altLang="en-US"/>
           </a:p>
@@ -5236,7 +5238,7 @@
           <a:p>
             <a:fld id="{C018CCD3-627B-468E-B64C-BDCCDCEFD60D}" type="datetimeFigureOut">
               <a:rPr lang="zh-TW" altLang="en-US" smtClean="0"/>
-              <a:t>2018/4/21</a:t>
+              <a:t>2018/4/25</a:t>
             </a:fld>
             <a:endParaRPr lang="zh-TW" altLang="en-US"/>
           </a:p>
@@ -6052,7 +6054,7 @@
           <a:p>
             <a:fld id="{C018CCD3-627B-468E-B64C-BDCCDCEFD60D}" type="datetimeFigureOut">
               <a:rPr lang="zh-TW" altLang="en-US" smtClean="0"/>
-              <a:t>2018/4/21</a:t>
+              <a:t>2018/4/25</a:t>
             </a:fld>
             <a:endParaRPr lang="zh-TW" altLang="en-US"/>
           </a:p>
@@ -7411,7 +7413,7 @@
         <p:spPr>
           <a:xfrm>
             <a:off x="609599" y="2160590"/>
-            <a:ext cx="6347714" cy="4580778"/>
+            <a:ext cx="6626698" cy="4580778"/>
           </a:xfrm>
         </p:spPr>
         <p:txBody>
@@ -7421,181 +7423,177 @@
           <a:lstStyle/>
           <a:p>
             <a:r>
-              <a:rPr lang="en-US" altLang="zh-TW" sz="1300" dirty="0" smtClean="0"/>
+              <a:rPr lang="en-US" altLang="zh-TW" sz="1400" dirty="0" smtClean="0"/>
               <a:t>Table</a:t>
             </a:r>
           </a:p>
           <a:p>
             <a:pPr lvl="1"/>
             <a:r>
-              <a:rPr lang="zh-TW" altLang="en-US" sz="1300" dirty="0" smtClean="0"/>
+              <a:rPr lang="zh-TW" altLang="en-US" sz="1400" dirty="0" smtClean="0"/>
               <a:t>指定</a:t>
             </a:r>
             <a:r>
-              <a:rPr lang="en-US" altLang="zh-TW" sz="1300" dirty="0"/>
+              <a:rPr lang="en-US" altLang="zh-TW" sz="1400" dirty="0"/>
               <a:t> </a:t>
             </a:r>
             <a:r>
-              <a:rPr lang="en-US" altLang="zh-TW" sz="1300" dirty="0" smtClean="0"/>
+              <a:rPr lang="en-US" altLang="zh-TW" sz="1400" dirty="0" smtClean="0"/>
               <a:t>Table </a:t>
             </a:r>
             <a:r>
-              <a:rPr lang="zh-TW" altLang="en-US" sz="1300" dirty="0" smtClean="0"/>
+              <a:rPr lang="zh-TW" altLang="en-US" sz="1400" dirty="0" smtClean="0"/>
               <a:t>名稱</a:t>
             </a:r>
-            <a:endParaRPr lang="en-US" altLang="zh-TW" sz="1300" dirty="0" smtClean="0"/>
-          </a:p>
-          <a:p>
-            <a:r>
-              <a:rPr lang="en-US" altLang="zh-TW" sz="1300" dirty="0" smtClean="0"/>
+            <a:endParaRPr lang="en-US" altLang="zh-TW" sz="1400" dirty="0" smtClean="0"/>
+          </a:p>
+          <a:p>
+            <a:r>
+              <a:rPr lang="en-US" altLang="zh-TW" sz="1400" dirty="0" smtClean="0"/>
               <a:t>Key</a:t>
             </a:r>
           </a:p>
           <a:p>
             <a:pPr lvl="1"/>
             <a:r>
-              <a:rPr lang="zh-TW" altLang="en-US" sz="1300" dirty="0" smtClean="0"/>
+              <a:rPr lang="zh-TW" altLang="en-US" sz="1400" dirty="0" smtClean="0"/>
               <a:t>標記此屬性為</a:t>
             </a:r>
             <a:r>
-              <a:rPr lang="en-US" altLang="zh-TW" sz="1300" dirty="0" smtClean="0"/>
+              <a:rPr lang="en-US" altLang="zh-TW" sz="1400" dirty="0" smtClean="0"/>
               <a:t> PK , </a:t>
             </a:r>
             <a:r>
-              <a:rPr lang="zh-TW" altLang="en-US" sz="1300" dirty="0" smtClean="0"/>
-              <a:t>並會使用資料庫自動</a:t>
-            </a:r>
-            <a:r>
-              <a:rPr lang="zh-TW" altLang="en-US" sz="1300" dirty="0" smtClean="0"/>
-              <a:t>編號</a:t>
-            </a:r>
-            <a:r>
-              <a:rPr lang="en-US" altLang="zh-TW" sz="1300" dirty="0" smtClean="0"/>
+              <a:rPr lang="zh-TW" altLang="en-US" sz="1400" dirty="0" smtClean="0"/>
+              <a:t>並會使用資料庫自動編號</a:t>
+            </a:r>
+            <a:r>
+              <a:rPr lang="en-US" altLang="zh-TW" sz="1400" dirty="0" smtClean="0"/>
               <a:t>, </a:t>
             </a:r>
             <a:r>
-              <a:rPr lang="zh-TW" altLang="en-US" sz="1300" dirty="0" smtClean="0"/>
+              <a:rPr lang="zh-TW" altLang="en-US" sz="1400" dirty="0" smtClean="0"/>
               <a:t>故</a:t>
             </a:r>
             <a:r>
-              <a:rPr lang="en-US" altLang="zh-TW" sz="1300" dirty="0" smtClean="0"/>
+              <a:rPr lang="en-US" altLang="zh-TW" sz="1400" dirty="0" smtClean="0"/>
               <a:t>Insert()</a:t>
             </a:r>
             <a:r>
-              <a:rPr lang="zh-TW" altLang="en-US" sz="1300" dirty="0" smtClean="0"/>
+              <a:rPr lang="zh-TW" altLang="en-US" sz="1400" dirty="0" smtClean="0"/>
               <a:t>不會包含此欄位</a:t>
             </a:r>
-            <a:endParaRPr lang="en-US" altLang="zh-TW" sz="1300" dirty="0" smtClean="0"/>
-          </a:p>
-          <a:p>
-            <a:r>
-              <a:rPr lang="en-US" altLang="zh-TW" sz="1300" dirty="0" err="1" smtClean="0"/>
+            <a:endParaRPr lang="en-US" altLang="zh-TW" sz="1400" dirty="0" smtClean="0"/>
+          </a:p>
+          <a:p>
+            <a:r>
+              <a:rPr lang="en-US" altLang="zh-TW" sz="1400" dirty="0" err="1" smtClean="0"/>
               <a:t>ExplicitKey</a:t>
             </a:r>
-            <a:endParaRPr lang="en-US" altLang="zh-TW" sz="1300" dirty="0" smtClean="0"/>
+            <a:endParaRPr lang="en-US" altLang="zh-TW" sz="1400" dirty="0" smtClean="0"/>
           </a:p>
           <a:p>
             <a:pPr lvl="1"/>
             <a:r>
-              <a:rPr lang="zh-TW" altLang="en-US" sz="1300" dirty="0" smtClean="0"/>
+              <a:rPr lang="zh-TW" altLang="en-US" sz="1400" dirty="0" smtClean="0"/>
               <a:t>標記此屬性為</a:t>
             </a:r>
             <a:r>
-              <a:rPr lang="en-US" altLang="zh-TW" sz="1300" dirty="0" smtClean="0"/>
+              <a:rPr lang="en-US" altLang="zh-TW" sz="1400" dirty="0" smtClean="0"/>
               <a:t> PK , </a:t>
             </a:r>
             <a:r>
-              <a:rPr lang="zh-TW" altLang="en-US" sz="1300" dirty="0" smtClean="0"/>
+              <a:rPr lang="zh-TW" altLang="en-US" sz="1400" dirty="0" smtClean="0"/>
               <a:t>但不使用資料庫自動編號</a:t>
             </a:r>
             <a:r>
-              <a:rPr lang="en-US" altLang="zh-TW" sz="1300" dirty="0" smtClean="0"/>
+              <a:rPr lang="en-US" altLang="zh-TW" sz="1400" dirty="0" smtClean="0"/>
               <a:t>, </a:t>
             </a:r>
             <a:r>
-              <a:rPr lang="zh-TW" altLang="en-US" sz="1300" dirty="0" smtClean="0"/>
+              <a:rPr lang="zh-TW" altLang="en-US" sz="1400" dirty="0" smtClean="0"/>
               <a:t>會由程式賦予值</a:t>
             </a:r>
-            <a:endParaRPr lang="en-US" altLang="zh-TW" sz="1300" dirty="0" smtClean="0"/>
-          </a:p>
-          <a:p>
-            <a:r>
-              <a:rPr lang="en-US" altLang="zh-TW" sz="1300" dirty="0" smtClean="0"/>
+            <a:endParaRPr lang="en-US" altLang="zh-TW" sz="1400" dirty="0" smtClean="0"/>
+          </a:p>
+          <a:p>
+            <a:r>
+              <a:rPr lang="en-US" altLang="zh-TW" sz="1400" dirty="0" smtClean="0"/>
               <a:t>Write</a:t>
             </a:r>
           </a:p>
           <a:p>
             <a:pPr lvl="1"/>
             <a:r>
-              <a:rPr lang="zh-TW" altLang="en-US" sz="1300" dirty="0" smtClean="0"/>
+              <a:rPr lang="zh-TW" altLang="en-US" sz="1400" dirty="0" smtClean="0"/>
               <a:t>標記此屬性不寫入資料庫</a:t>
             </a:r>
-            <a:endParaRPr lang="en-US" altLang="zh-TW" sz="1300" dirty="0"/>
+            <a:endParaRPr lang="en-US" altLang="zh-TW" sz="1400" dirty="0"/>
           </a:p>
           <a:p>
             <a:pPr lvl="1"/>
             <a:r>
-              <a:rPr lang="zh-TW" altLang="en-US" sz="1300" dirty="0" smtClean="0"/>
+              <a:rPr lang="zh-TW" altLang="en-US" sz="1400" dirty="0" smtClean="0"/>
               <a:t>為 </a:t>
             </a:r>
             <a:r>
-              <a:rPr lang="en-US" altLang="zh-TW" sz="1300" dirty="0" smtClean="0"/>
+              <a:rPr lang="en-US" altLang="zh-TW" sz="1400" dirty="0" smtClean="0"/>
               <a:t>false </a:t>
             </a:r>
             <a:r>
-              <a:rPr lang="zh-TW" altLang="en-US" sz="1300" dirty="0" smtClean="0"/>
+              <a:rPr lang="zh-TW" altLang="en-US" sz="1400" dirty="0" smtClean="0"/>
               <a:t>時不會被存入</a:t>
             </a:r>
             <a:r>
-              <a:rPr lang="en-US" altLang="zh-TW" sz="1300" dirty="0" smtClean="0"/>
+              <a:rPr lang="en-US" altLang="zh-TW" sz="1400" dirty="0" smtClean="0"/>
               <a:t> Dapper cache</a:t>
             </a:r>
           </a:p>
           <a:p>
             <a:r>
-              <a:rPr lang="en-US" altLang="zh-TW" sz="1300" dirty="0" smtClean="0"/>
+              <a:rPr lang="en-US" altLang="zh-TW" sz="1400" dirty="0" smtClean="0"/>
               <a:t>Computed</a:t>
             </a:r>
           </a:p>
           <a:p>
             <a:pPr lvl="1"/>
             <a:r>
-              <a:rPr lang="zh-TW" altLang="en-US" sz="1300" dirty="0" smtClean="0"/>
+              <a:rPr lang="zh-TW" altLang="en-US" sz="1400" dirty="0" smtClean="0"/>
               <a:t>標記此屬性為計算出來的屬性，不寫入資料庫</a:t>
             </a:r>
-            <a:endParaRPr lang="en-US" altLang="zh-TW" sz="1300" dirty="0" smtClean="0"/>
+            <a:endParaRPr lang="en-US" altLang="zh-TW" sz="1400" dirty="0" smtClean="0"/>
           </a:p>
           <a:p>
             <a:pPr marL="514350" lvl="1" indent="0">
               <a:buNone/>
             </a:pPr>
-            <a:endParaRPr lang="en-US" altLang="zh-TW" sz="1300" dirty="0" smtClean="0"/>
+            <a:endParaRPr lang="en-US" altLang="zh-TW" sz="1400" dirty="0" smtClean="0"/>
           </a:p>
           <a:p>
             <a:pPr marL="514350" lvl="1" indent="0">
               <a:buNone/>
             </a:pPr>
             <a:r>
-              <a:rPr lang="zh-TW" altLang="en-US" sz="1300" b="1" dirty="0" smtClean="0"/>
+              <a:rPr lang="zh-TW" altLang="en-US" sz="1400" b="1" dirty="0" smtClean="0"/>
               <a:t>注意</a:t>
             </a:r>
             <a:r>
-              <a:rPr lang="en-US" altLang="zh-TW" sz="1300" b="1" dirty="0" smtClean="0"/>
+              <a:rPr lang="en-US" altLang="zh-TW" sz="1400" b="1" dirty="0" smtClean="0"/>
               <a:t> namespace </a:t>
             </a:r>
             <a:r>
-              <a:rPr lang="zh-TW" altLang="en-US" sz="1300" b="1" dirty="0" smtClean="0"/>
+              <a:rPr lang="zh-TW" altLang="en-US" sz="1400" b="1" dirty="0" smtClean="0"/>
               <a:t>是 </a:t>
             </a:r>
             <a:r>
-              <a:rPr lang="en-US" altLang="zh-TW" sz="1300" b="1" dirty="0" err="1" smtClean="0"/>
+              <a:rPr lang="en-US" altLang="zh-TW" sz="1400" b="1" dirty="0" err="1" smtClean="0"/>
               <a:t>Dapper.Contrib.Extensions</a:t>
             </a:r>
             <a:r>
-              <a:rPr lang="en-US" altLang="zh-TW" sz="1300" b="1" dirty="0" smtClean="0"/>
+              <a:rPr lang="en-US" altLang="zh-TW" sz="1400" b="1" dirty="0" smtClean="0"/>
               <a:t>;</a:t>
             </a:r>
-            <a:endParaRPr lang="en-US" altLang="zh-TW" sz="1300" b="1" dirty="0"/>
+            <a:endParaRPr lang="en-US" altLang="zh-TW" sz="1400" b="1" dirty="0"/>
           </a:p>
         </p:txBody>
       </p:sp>
@@ -7736,11 +7734,7 @@
             </a:r>
             <a:r>
               <a:rPr lang="en-US" altLang="zh-TW" b="1" dirty="0" smtClean="0"/>
-              <a:t> </a:t>
-            </a:r>
-            <a:r>
-              <a:rPr lang="en-US" altLang="zh-TW" b="1" dirty="0" smtClean="0"/>
-              <a:t>found</a:t>
+              <a:t> found</a:t>
             </a:r>
           </a:p>
           <a:p>
@@ -7830,6 +7824,324 @@
           <a:lstStyle/>
           <a:p>
             <a:r>
+              <a:rPr lang="en-US" altLang="zh-TW" dirty="0"/>
+              <a:t>Benchmark with EF Core</a:t>
+            </a:r>
+            <a:endParaRPr lang="zh-TW" altLang="en-US" dirty="0"/>
+          </a:p>
+        </p:txBody>
+      </p:sp>
+      <p:sp>
+        <p:nvSpPr>
+          <p:cNvPr id="3" name="內容版面配置區 2"/>
+          <p:cNvSpPr>
+            <a:spLocks noGrp="1"/>
+          </p:cNvSpPr>
+          <p:nvPr>
+            <p:ph idx="1"/>
+          </p:nvPr>
+        </p:nvSpPr>
+        <p:spPr/>
+        <p:txBody>
+          <a:bodyPr/>
+          <a:lstStyle/>
+          <a:p>
+            <a:endParaRPr lang="zh-TW" altLang="en-US"/>
+          </a:p>
+        </p:txBody>
+      </p:sp>
+      <p:pic>
+        <p:nvPicPr>
+          <p:cNvPr id="1026" name="Picture 2"/>
+          <p:cNvPicPr>
+            <a:picLocks noChangeAspect="1" noChangeArrowheads="1"/>
+          </p:cNvPicPr>
+          <p:nvPr/>
+        </p:nvPicPr>
+        <p:blipFill>
+          <a:blip r:embed="rId3">
+            <a:extLst>
+              <a:ext uri="{28A0092B-C50C-407E-A947-70E740481C1C}">
+                <a14:useLocalDpi xmlns:a14="http://schemas.microsoft.com/office/drawing/2010/main" val="0"/>
+              </a:ext>
+            </a:extLst>
+          </a:blip>
+          <a:srcRect/>
+          <a:stretch>
+            <a:fillRect/>
+          </a:stretch>
+        </p:blipFill>
+        <p:spPr bwMode="auto">
+          <a:xfrm>
+            <a:off x="179511" y="1700808"/>
+            <a:ext cx="8640961" cy="4293604"/>
+          </a:xfrm>
+          <a:prstGeom prst="rect">
+            <a:avLst/>
+          </a:prstGeom>
+          <a:noFill/>
+          <a:ln>
+            <a:noFill/>
+          </a:ln>
+          <a:extLst>
+            <a:ext uri="{909E8E84-426E-40DD-AFC4-6F175D3DCCD1}">
+              <a14:hiddenFill xmlns:a14="http://schemas.microsoft.com/office/drawing/2010/main">
+                <a:solidFill>
+                  <a:schemeClr val="accent1"/>
+                </a:solidFill>
+              </a14:hiddenFill>
+            </a:ext>
+            <a:ext uri="{91240B29-F687-4F45-9708-019B960494DF}">
+              <a14:hiddenLine xmlns:a14="http://schemas.microsoft.com/office/drawing/2010/main" w="9525">
+                <a:solidFill>
+                  <a:schemeClr val="tx1"/>
+                </a:solidFill>
+                <a:miter lim="800000"/>
+                <a:headEnd/>
+                <a:tailEnd/>
+              </a14:hiddenLine>
+            </a:ext>
+          </a:extLst>
+        </p:spPr>
+      </p:pic>
+      <p:graphicFrame>
+        <p:nvGraphicFramePr>
+          <p:cNvPr id="4" name="物件 3"/>
+          <p:cNvGraphicFramePr>
+            <a:graphicFrameLocks noChangeAspect="1"/>
+          </p:cNvGraphicFramePr>
+          <p:nvPr>
+            <p:extLst>
+              <p:ext uri="{D42A27DB-BD31-4B8C-83A1-F6EECF244321}">
+                <p14:modId xmlns:p14="http://schemas.microsoft.com/office/powerpoint/2010/main" val="2155017669"/>
+              </p:ext>
+            </p:extLst>
+          </p:nvPr>
+        </p:nvGraphicFramePr>
+        <p:xfrm>
+          <a:off x="193579" y="6309320"/>
+          <a:ext cx="1506537" cy="388937"/>
+        </p:xfrm>
+        <a:graphic>
+          <a:graphicData uri="http://schemas.openxmlformats.org/presentationml/2006/ole">
+            <mc:AlternateContent xmlns:mc="http://schemas.openxmlformats.org/markup-compatibility/2006">
+              <mc:Choice xmlns:v="urn:schemas-microsoft-com:vml" Requires="v">
+                <p:oleObj spid="_x0000_s1028" name="封裝程式殼層物件" showAsIcon="1" r:id="rId4" imgW="1506240" imgH="388440" progId="Package">
+                  <p:embed/>
+                </p:oleObj>
+              </mc:Choice>
+              <mc:Fallback>
+                <p:oleObj name="封裝程式殼層物件" showAsIcon="1" r:id="rId4" imgW="1506240" imgH="388440" progId="Package">
+                  <p:embed/>
+                  <p:pic>
+                    <p:nvPicPr>
+                      <p:cNvPr id="0" name=""/>
+                      <p:cNvPicPr/>
+                      <p:nvPr/>
+                    </p:nvPicPr>
+                    <p:blipFill>
+                      <a:blip r:embed="rId5"/>
+                      <a:stretch>
+                        <a:fillRect/>
+                      </a:stretch>
+                    </p:blipFill>
+                    <p:spPr>
+                      <a:xfrm>
+                        <a:off x="193579" y="6309320"/>
+                        <a:ext cx="1506537" cy="388937"/>
+                      </a:xfrm>
+                      <a:prstGeom prst="rect">
+                        <a:avLst/>
+                      </a:prstGeom>
+                    </p:spPr>
+                  </p:pic>
+                </p:oleObj>
+              </mc:Fallback>
+            </mc:AlternateContent>
+          </a:graphicData>
+        </a:graphic>
+      </p:graphicFrame>
+    </p:spTree>
+    <p:extLst>
+      <p:ext uri="{BB962C8B-B14F-4D97-AF65-F5344CB8AC3E}">
+        <p14:creationId xmlns:p14="http://schemas.microsoft.com/office/powerpoint/2010/main" val="1764716005"/>
+      </p:ext>
+    </p:extLst>
+  </p:cSld>
+  <p:clrMapOvr>
+    <a:masterClrMapping/>
+  </p:clrMapOvr>
+</p:sld>
+</file>
+
+<file path=ppt/slides/slide16.xml><?xml version="1.0" encoding="utf-8"?>
+<p:sld xmlns:a="http://schemas.openxmlformats.org/drawingml/2006/main" xmlns:r="http://schemas.openxmlformats.org/officeDocument/2006/relationships" xmlns:p="http://schemas.openxmlformats.org/presentationml/2006/main">
+  <p:cSld>
+    <p:spTree>
+      <p:nvGrpSpPr>
+        <p:cNvPr id="1" name=""/>
+        <p:cNvGrpSpPr/>
+        <p:nvPr/>
+      </p:nvGrpSpPr>
+      <p:grpSpPr>
+        <a:xfrm>
+          <a:off x="0" y="0"/>
+          <a:ext cx="0" cy="0"/>
+          <a:chOff x="0" y="0"/>
+          <a:chExt cx="0" cy="0"/>
+        </a:xfrm>
+      </p:grpSpPr>
+      <p:sp>
+        <p:nvSpPr>
+          <p:cNvPr id="2" name="標題 1"/>
+          <p:cNvSpPr>
+            <a:spLocks noGrp="1"/>
+          </p:cNvSpPr>
+          <p:nvPr>
+            <p:ph type="title"/>
+          </p:nvPr>
+        </p:nvSpPr>
+        <p:spPr/>
+        <p:txBody>
+          <a:bodyPr/>
+          <a:lstStyle/>
+          <a:p>
+            <a:r>
+              <a:rPr lang="en-US" altLang="zh-TW" dirty="0"/>
+              <a:t>Benchmark with EF </a:t>
+            </a:r>
+            <a:r>
+              <a:rPr lang="en-US" altLang="zh-TW" dirty="0" smtClean="0"/>
+              <a:t>Core</a:t>
+            </a:r>
+            <a:endParaRPr lang="en-US" altLang="zh-TW" dirty="0"/>
+          </a:p>
+        </p:txBody>
+      </p:sp>
+      <p:sp>
+        <p:nvSpPr>
+          <p:cNvPr id="3" name="內容版面配置區 2"/>
+          <p:cNvSpPr>
+            <a:spLocks noGrp="1"/>
+          </p:cNvSpPr>
+          <p:nvPr>
+            <p:ph idx="1"/>
+          </p:nvPr>
+        </p:nvSpPr>
+        <p:spPr>
+          <a:xfrm>
+            <a:off x="609599" y="2160590"/>
+            <a:ext cx="6347714" cy="3932706"/>
+          </a:xfrm>
+        </p:spPr>
+        <p:txBody>
+          <a:bodyPr>
+            <a:noAutofit/>
+          </a:bodyPr>
+          <a:lstStyle/>
+          <a:p>
+            <a:r>
+              <a:rPr lang="en-US" altLang="zh-TW" dirty="0"/>
+              <a:t>Mean : Arithmetic mean of all measurements </a:t>
+            </a:r>
+            <a:endParaRPr lang="en-US" altLang="zh-TW" dirty="0" smtClean="0"/>
+          </a:p>
+          <a:p>
+            <a:r>
+              <a:rPr lang="en-US" altLang="zh-TW" dirty="0" smtClean="0"/>
+              <a:t>Error </a:t>
+            </a:r>
+            <a:r>
+              <a:rPr lang="en-US" altLang="zh-TW" dirty="0"/>
+              <a:t>: Half of 99.9% confidence interval </a:t>
+            </a:r>
+            <a:endParaRPr lang="en-US" altLang="zh-TW" dirty="0" smtClean="0"/>
+          </a:p>
+          <a:p>
+            <a:r>
+              <a:rPr lang="en-US" altLang="zh-TW" dirty="0" err="1" smtClean="0"/>
+              <a:t>StdDev</a:t>
+            </a:r>
+            <a:r>
+              <a:rPr lang="en-US" altLang="zh-TW" dirty="0" smtClean="0"/>
+              <a:t> </a:t>
+            </a:r>
+            <a:r>
+              <a:rPr lang="en-US" altLang="zh-TW" dirty="0"/>
+              <a:t>: Standard deviation of all measurements </a:t>
+            </a:r>
+            <a:endParaRPr lang="en-US" altLang="zh-TW" dirty="0" smtClean="0"/>
+          </a:p>
+          <a:p>
+            <a:r>
+              <a:rPr lang="en-US" altLang="zh-TW" dirty="0" smtClean="0"/>
+              <a:t>Gen </a:t>
+            </a:r>
+            <a:r>
+              <a:rPr lang="en-US" altLang="zh-TW" dirty="0"/>
+              <a:t>0 : GC Generation 0 collects per 1k Operations </a:t>
+            </a:r>
+            <a:endParaRPr lang="en-US" altLang="zh-TW" dirty="0" smtClean="0"/>
+          </a:p>
+          <a:p>
+            <a:r>
+              <a:rPr lang="en-US" altLang="zh-TW" dirty="0" smtClean="0"/>
+              <a:t>Allocated </a:t>
+            </a:r>
+            <a:r>
+              <a:rPr lang="en-US" altLang="zh-TW" dirty="0"/>
+              <a:t>: Allocated memory per single operation (managed only, inclusive, 1KB = 1024B)</a:t>
+            </a:r>
+            <a:endParaRPr lang="en-US" altLang="zh-TW" b="1" dirty="0"/>
+          </a:p>
+        </p:txBody>
+      </p:sp>
+    </p:spTree>
+    <p:extLst>
+      <p:ext uri="{BB962C8B-B14F-4D97-AF65-F5344CB8AC3E}">
+        <p14:creationId xmlns:p14="http://schemas.microsoft.com/office/powerpoint/2010/main" val="4078067396"/>
+      </p:ext>
+    </p:extLst>
+  </p:cSld>
+  <p:clrMapOvr>
+    <a:masterClrMapping/>
+  </p:clrMapOvr>
+</p:sld>
+</file>
+
+<file path=ppt/slides/slide17.xml><?xml version="1.0" encoding="utf-8"?>
+<p:sld xmlns:a="http://schemas.openxmlformats.org/drawingml/2006/main" xmlns:r="http://schemas.openxmlformats.org/officeDocument/2006/relationships" xmlns:p="http://schemas.openxmlformats.org/presentationml/2006/main">
+  <p:cSld>
+    <p:spTree>
+      <p:nvGrpSpPr>
+        <p:cNvPr id="1" name=""/>
+        <p:cNvGrpSpPr/>
+        <p:nvPr/>
+      </p:nvGrpSpPr>
+      <p:grpSpPr>
+        <a:xfrm>
+          <a:off x="0" y="0"/>
+          <a:ext cx="0" cy="0"/>
+          <a:chOff x="0" y="0"/>
+          <a:chExt cx="0" cy="0"/>
+        </a:xfrm>
+      </p:grpSpPr>
+      <p:sp>
+        <p:nvSpPr>
+          <p:cNvPr id="2" name="標題 1"/>
+          <p:cNvSpPr>
+            <a:spLocks noGrp="1"/>
+          </p:cNvSpPr>
+          <p:nvPr>
+            <p:ph type="title"/>
+          </p:nvPr>
+        </p:nvSpPr>
+        <p:spPr/>
+        <p:txBody>
+          <a:bodyPr/>
+          <a:lstStyle/>
+          <a:p>
+            <a:r>
               <a:rPr lang="en-US" altLang="zh-TW" dirty="0" smtClean="0"/>
               <a:t>Reference</a:t>
             </a:r>
@@ -8093,8 +8405,14 @@
           <a:p>
             <a:pPr lvl="1"/>
             <a:r>
-              <a:rPr lang="en-US" altLang="zh-TW" dirty="0"/>
+              <a:rPr lang="en-US" altLang="zh-TW" dirty="0" smtClean="0"/>
               <a:t>Assumptions</a:t>
+            </a:r>
+          </a:p>
+          <a:p>
+            <a:r>
+              <a:rPr lang="en-US" altLang="zh-TW" dirty="0" smtClean="0"/>
+              <a:t>Benchmark with EF Core</a:t>
             </a:r>
             <a:endParaRPr lang="en-US" altLang="zh-TW" dirty="0" smtClean="0"/>
           </a:p>
@@ -9738,7 +10056,7 @@
   <a:extraClrSchemeLst/>
   <a:extLst>
     <a:ext uri="{05A4C25C-085E-4340-85A3-A5531E510DB2}">
-      <thm15:themeFamily xmlns:thm15="http://schemas.microsoft.com/office/thememl/2012/main" xmlns="" name="Facet" id="{C0C680CD-088A-49FC-A102-D699147F32B2}" vid="{8C59B386-999D-4CB6-B907-9F3997C027CC}"/>
+      <thm15:themeFamily xmlns="" xmlns:thm15="http://schemas.microsoft.com/office/thememl/2012/main" name="Facet" id="{C0C680CD-088A-49FC-A102-D699147F32B2}" vid="{8C59B386-999D-4CB6-B907-9F3997C027CC}"/>
     </a:ext>
   </a:extLst>
 </a:theme>

</xml_diff>

<commit_message>
update ppt and connection string
</commit_message>
<xml_diff>
--- a/Dapper.pptx
+++ b/Dapper.pptx
@@ -125,7 +125,7 @@
   </p:defaultTextStyle>
   <p:extLst>
     <p:ext uri="{EFAFB233-063F-42B5-8137-9DF3F51BA10A}">
-      <p15:sldGuideLst xmlns:p15="http://schemas.microsoft.com/office/powerpoint/2012/main" xmlns="">
+      <p15:sldGuideLst xmlns:p15="http://schemas.microsoft.com/office/powerpoint/2012/main">
         <p15:guide id="1" orient="horz" pos="2160">
           <p15:clr>
             <a:srgbClr val="A4A3A4"/>
@@ -224,7 +224,7 @@
           <a:p>
             <a:fld id="{ACCAADC0-F719-458B-806E-BB661BCF77D7}" type="datetimeFigureOut">
               <a:rPr lang="zh-TW" altLang="en-US" smtClean="0"/>
-              <a:t>2018/4/25</a:t>
+              <a:t>2018/4/30</a:t>
             </a:fld>
             <a:endParaRPr lang="zh-TW" altLang="en-US"/>
           </a:p>
@@ -288,38 +288,37 @@
           <a:p>
             <a:pPr lvl="0"/>
             <a:r>
-              <a:rPr lang="zh-TW" altLang="en-US" smtClean="0"/>
+              <a:rPr lang="zh-TW" altLang="en-US"/>
               <a:t>按一下以編輯母片文字樣式</a:t>
             </a:r>
           </a:p>
           <a:p>
             <a:pPr lvl="1"/>
             <a:r>
-              <a:rPr lang="zh-TW" altLang="en-US" smtClean="0"/>
+              <a:rPr lang="zh-TW" altLang="en-US"/>
               <a:t>第二層</a:t>
             </a:r>
           </a:p>
           <a:p>
             <a:pPr lvl="2"/>
             <a:r>
-              <a:rPr lang="zh-TW" altLang="en-US" smtClean="0"/>
+              <a:rPr lang="zh-TW" altLang="en-US"/>
               <a:t>第三層</a:t>
             </a:r>
           </a:p>
           <a:p>
             <a:pPr lvl="3"/>
             <a:r>
-              <a:rPr lang="zh-TW" altLang="en-US" smtClean="0"/>
+              <a:rPr lang="zh-TW" altLang="en-US"/>
               <a:t>第四層</a:t>
             </a:r>
           </a:p>
           <a:p>
             <a:pPr lvl="4"/>
             <a:r>
-              <a:rPr lang="zh-TW" altLang="en-US" smtClean="0"/>
+              <a:rPr lang="zh-TW" altLang="en-US"/>
               <a:t>第五層</a:t>
             </a:r>
-            <a:endParaRPr lang="zh-TW" altLang="en-US"/>
           </a:p>
         </p:txBody>
       </p:sp>
@@ -621,7 +620,7 @@
           <a:lstStyle/>
           <a:p>
             <a:r>
-              <a:rPr lang="en-US" altLang="zh-TW" smtClean="0"/>
+              <a:rPr lang="en-US" altLang="zh-TW"/>
               <a:t>https://docs.microsoft.com/en-us/dotnet/framework/data/adonet/ef/overview</a:t>
             </a:r>
           </a:p>
@@ -711,78 +710,77 @@
           <a:lstStyle/>
           <a:p>
             <a:r>
-              <a:rPr lang="zh-TW" altLang="en-US" dirty="0" smtClean="0"/>
+              <a:rPr lang="zh-TW" altLang="en-US" dirty="0"/>
               <a:t>呼叫</a:t>
             </a:r>
             <a:r>
-              <a:rPr lang="en-US" altLang="zh-TW" dirty="0" smtClean="0"/>
+              <a:rPr lang="en-US" altLang="zh-TW" dirty="0"/>
               <a:t>Get()</a:t>
             </a:r>
             <a:r>
-              <a:rPr lang="zh-TW" altLang="en-US" dirty="0" smtClean="0"/>
+              <a:rPr lang="zh-TW" altLang="en-US" dirty="0"/>
               <a:t>及</a:t>
             </a:r>
             <a:r>
-              <a:rPr lang="en-US" altLang="zh-TW" dirty="0" err="1" smtClean="0"/>
+              <a:rPr lang="en-US" altLang="zh-TW" dirty="0" err="1"/>
               <a:t>GetAll</a:t>
             </a:r>
             <a:r>
-              <a:rPr lang="en-US" altLang="zh-TW" dirty="0" smtClean="0"/>
+              <a:rPr lang="en-US" altLang="zh-TW" dirty="0"/>
               <a:t>()</a:t>
             </a:r>
             <a:r>
-              <a:rPr lang="zh-TW" altLang="en-US" dirty="0" smtClean="0"/>
+              <a:rPr lang="zh-TW" altLang="en-US" dirty="0"/>
               <a:t>時</a:t>
             </a:r>
             <a:r>
-              <a:rPr lang="en-US" altLang="zh-TW" dirty="0" smtClean="0"/>
+              <a:rPr lang="en-US" altLang="zh-TW" dirty="0"/>
               <a:t>, </a:t>
             </a:r>
             <a:r>
-              <a:rPr lang="zh-TW" altLang="en-US" dirty="0" smtClean="0"/>
+              <a:rPr lang="zh-TW" altLang="en-US" dirty="0"/>
               <a:t>當</a:t>
             </a:r>
             <a:r>
-              <a:rPr lang="en-US" altLang="zh-TW" dirty="0" smtClean="0"/>
+              <a:rPr lang="en-US" altLang="zh-TW" dirty="0"/>
               <a:t>Entity</a:t>
             </a:r>
             <a:r>
-              <a:rPr lang="zh-TW" altLang="en-US" dirty="0" smtClean="0"/>
+              <a:rPr lang="zh-TW" altLang="en-US" dirty="0"/>
               <a:t>傳入</a:t>
             </a:r>
             <a:r>
-              <a:rPr lang="en-US" altLang="zh-TW" dirty="0" smtClean="0"/>
+              <a:rPr lang="en-US" altLang="zh-TW" dirty="0"/>
               <a:t>type</a:t>
             </a:r>
             <a:r>
-              <a:rPr lang="zh-TW" altLang="en-US" dirty="0" smtClean="0"/>
+              <a:rPr lang="zh-TW" altLang="en-US" dirty="0"/>
               <a:t>為</a:t>
             </a:r>
             <a:r>
-              <a:rPr lang="en-US" altLang="zh-TW" dirty="0" smtClean="0"/>
+              <a:rPr lang="en-US" altLang="zh-TW" dirty="0"/>
               <a:t>interface, Write = false</a:t>
             </a:r>
             <a:r>
-              <a:rPr lang="zh-TW" altLang="en-US" dirty="0" smtClean="0"/>
+              <a:rPr lang="zh-TW" altLang="en-US" dirty="0"/>
               <a:t>的欄位不會被讀取</a:t>
             </a:r>
             <a:r>
-              <a:rPr lang="en-US" altLang="zh-TW" dirty="0" smtClean="0"/>
+              <a:rPr lang="en-US" altLang="zh-TW" dirty="0"/>
               <a:t>, </a:t>
             </a:r>
             <a:r>
-              <a:rPr lang="zh-TW" altLang="en-US" dirty="0" smtClean="0"/>
+              <a:rPr lang="zh-TW" altLang="en-US" dirty="0"/>
               <a:t>但</a:t>
             </a:r>
             <a:r>
-              <a:rPr lang="en-US" altLang="zh-TW" dirty="0" smtClean="0"/>
+              <a:rPr lang="en-US" altLang="zh-TW" dirty="0"/>
               <a:t>Computed</a:t>
             </a:r>
             <a:r>
-              <a:rPr lang="zh-TW" altLang="en-US" dirty="0" smtClean="0"/>
+              <a:rPr lang="zh-TW" altLang="en-US" dirty="0"/>
               <a:t>則會被讀取</a:t>
             </a:r>
-            <a:endParaRPr lang="zh-TW" altLang="en-US" dirty="0"/>
           </a:p>
         </p:txBody>
       </p:sp>
@@ -867,7 +865,7 @@
           <a:lstStyle/>
           <a:p>
             <a:r>
-              <a:rPr lang="en-US" altLang="zh-TW" dirty="0" smtClean="0"/>
+              <a:rPr lang="en-US" altLang="zh-TW" dirty="0"/>
               <a:t>http://benchmarkdotnet.org/index.htm</a:t>
             </a:r>
             <a:endParaRPr lang="zh-TW" altLang="en-US" dirty="0"/>
@@ -1707,7 +1705,7 @@
           <a:p>
             <a:fld id="{C018CCD3-627B-468E-B64C-BDCCDCEFD60D}" type="datetimeFigureOut">
               <a:rPr lang="zh-TW" altLang="en-US" smtClean="0"/>
-              <a:t>2018/4/25</a:t>
+              <a:t>2018/4/30</a:t>
             </a:fld>
             <a:endParaRPr lang="zh-TW" altLang="en-US"/>
           </a:p>
@@ -1958,7 +1956,7 @@
           <a:p>
             <a:fld id="{C018CCD3-627B-468E-B64C-BDCCDCEFD60D}" type="datetimeFigureOut">
               <a:rPr lang="zh-TW" altLang="en-US" smtClean="0"/>
-              <a:t>2018/4/25</a:t>
+              <a:t>2018/4/30</a:t>
             </a:fld>
             <a:endParaRPr lang="zh-TW" altLang="en-US"/>
           </a:p>
@@ -2272,7 +2270,7 @@
           <a:p>
             <a:fld id="{C018CCD3-627B-468E-B64C-BDCCDCEFD60D}" type="datetimeFigureOut">
               <a:rPr lang="zh-TW" altLang="en-US" smtClean="0"/>
-              <a:t>2018/4/25</a:t>
+              <a:t>2018/4/30</a:t>
             </a:fld>
             <a:endParaRPr lang="zh-TW" altLang="en-US"/>
           </a:p>
@@ -2599,7 +2597,7 @@
           <a:p>
             <a:fld id="{C018CCD3-627B-468E-B64C-BDCCDCEFD60D}" type="datetimeFigureOut">
               <a:rPr lang="zh-TW" altLang="en-US" smtClean="0"/>
-              <a:t>2018/4/25</a:t>
+              <a:t>2018/4/30</a:t>
             </a:fld>
             <a:endParaRPr lang="zh-TW" altLang="en-US"/>
           </a:p>
@@ -2913,7 +2911,7 @@
           <a:p>
             <a:fld id="{C018CCD3-627B-468E-B64C-BDCCDCEFD60D}" type="datetimeFigureOut">
               <a:rPr lang="zh-TW" altLang="en-US" smtClean="0"/>
-              <a:t>2018/4/25</a:t>
+              <a:t>2018/4/30</a:t>
             </a:fld>
             <a:endParaRPr lang="zh-TW" altLang="en-US"/>
           </a:p>
@@ -3300,7 +3298,7 @@
           <a:p>
             <a:fld id="{C018CCD3-627B-468E-B64C-BDCCDCEFD60D}" type="datetimeFigureOut">
               <a:rPr lang="zh-TW" altLang="en-US" smtClean="0"/>
-              <a:t>2018/4/25</a:t>
+              <a:t>2018/4/30</a:t>
             </a:fld>
             <a:endParaRPr lang="zh-TW" altLang="en-US"/>
           </a:p>
@@ -3470,7 +3468,7 @@
           <a:p>
             <a:fld id="{C018CCD3-627B-468E-B64C-BDCCDCEFD60D}" type="datetimeFigureOut">
               <a:rPr lang="zh-TW" altLang="en-US" smtClean="0"/>
-              <a:t>2018/4/25</a:t>
+              <a:t>2018/4/30</a:t>
             </a:fld>
             <a:endParaRPr lang="zh-TW" altLang="en-US"/>
           </a:p>
@@ -3650,7 +3648,7 @@
           <a:p>
             <a:fld id="{C018CCD3-627B-468E-B64C-BDCCDCEFD60D}" type="datetimeFigureOut">
               <a:rPr lang="zh-TW" altLang="en-US" smtClean="0"/>
-              <a:t>2018/4/25</a:t>
+              <a:t>2018/4/30</a:t>
             </a:fld>
             <a:endParaRPr lang="zh-TW" altLang="en-US"/>
           </a:p>
@@ -3826,7 +3824,7 @@
           <a:p>
             <a:fld id="{C018CCD3-627B-468E-B64C-BDCCDCEFD60D}" type="datetimeFigureOut">
               <a:rPr lang="zh-TW" altLang="en-US" smtClean="0"/>
-              <a:t>2018/4/25</a:t>
+              <a:t>2018/4/30</a:t>
             </a:fld>
             <a:endParaRPr lang="zh-TW" altLang="en-US"/>
           </a:p>
@@ -4070,7 +4068,7 @@
           <a:p>
             <a:fld id="{C018CCD3-627B-468E-B64C-BDCCDCEFD60D}" type="datetimeFigureOut">
               <a:rPr lang="zh-TW" altLang="en-US" smtClean="0"/>
-              <a:t>2018/4/25</a:t>
+              <a:t>2018/4/30</a:t>
             </a:fld>
             <a:endParaRPr lang="zh-TW" altLang="en-US"/>
           </a:p>
@@ -4367,7 +4365,7 @@
           <a:p>
             <a:fld id="{C018CCD3-627B-468E-B64C-BDCCDCEFD60D}" type="datetimeFigureOut">
               <a:rPr lang="zh-TW" altLang="en-US" smtClean="0"/>
-              <a:t>2018/4/25</a:t>
+              <a:t>2018/4/30</a:t>
             </a:fld>
             <a:endParaRPr lang="zh-TW" altLang="en-US"/>
           </a:p>
@@ -4746,7 +4744,7 @@
           <a:p>
             <a:fld id="{C018CCD3-627B-468E-B64C-BDCCDCEFD60D}" type="datetimeFigureOut">
               <a:rPr lang="zh-TW" altLang="en-US" smtClean="0"/>
-              <a:t>2018/4/25</a:t>
+              <a:t>2018/4/30</a:t>
             </a:fld>
             <a:endParaRPr lang="zh-TW" altLang="en-US"/>
           </a:p>
@@ -4869,7 +4867,7 @@
           <a:p>
             <a:fld id="{C018CCD3-627B-468E-B64C-BDCCDCEFD60D}" type="datetimeFigureOut">
               <a:rPr lang="zh-TW" altLang="en-US" smtClean="0"/>
-              <a:t>2018/4/25</a:t>
+              <a:t>2018/4/30</a:t>
             </a:fld>
             <a:endParaRPr lang="zh-TW" altLang="en-US"/>
           </a:p>
@@ -4964,7 +4962,7 @@
           <a:p>
             <a:fld id="{C018CCD3-627B-468E-B64C-BDCCDCEFD60D}" type="datetimeFigureOut">
               <a:rPr lang="zh-TW" altLang="en-US" smtClean="0"/>
-              <a:t>2018/4/25</a:t>
+              <a:t>2018/4/30</a:t>
             </a:fld>
             <a:endParaRPr lang="zh-TW" altLang="en-US"/>
           </a:p>
@@ -5219,7 +5217,7 @@
           <a:p>
             <a:fld id="{C018CCD3-627B-468E-B64C-BDCCDCEFD60D}" type="datetimeFigureOut">
               <a:rPr lang="zh-TW" altLang="en-US" smtClean="0"/>
-              <a:t>2018/4/25</a:t>
+              <a:t>2018/4/30</a:t>
             </a:fld>
             <a:endParaRPr lang="zh-TW" altLang="en-US"/>
           </a:p>
@@ -5482,7 +5480,7 @@
           <a:p>
             <a:fld id="{C018CCD3-627B-468E-B64C-BDCCDCEFD60D}" type="datetimeFigureOut">
               <a:rPr lang="zh-TW" altLang="en-US" smtClean="0"/>
-              <a:t>2018/4/25</a:t>
+              <a:t>2018/4/30</a:t>
             </a:fld>
             <a:endParaRPr lang="zh-TW" altLang="en-US"/>
           </a:p>
@@ -6298,7 +6296,7 @@
           <a:p>
             <a:fld id="{C018CCD3-627B-468E-B64C-BDCCDCEFD60D}" type="datetimeFigureOut">
               <a:rPr lang="zh-TW" altLang="en-US" smtClean="0"/>
-              <a:t>2018/4/25</a:t>
+              <a:t>2018/4/30</a:t>
             </a:fld>
             <a:endParaRPr lang="zh-TW" altLang="en-US"/>
           </a:p>
@@ -6838,7 +6836,7 @@
           <a:lstStyle/>
           <a:p>
             <a:r>
-              <a:rPr lang="en-US" altLang="zh-TW" sz="4800" dirty="0" smtClean="0"/>
+              <a:rPr lang="en-US" altLang="zh-TW" sz="4800" dirty="0"/>
               <a:t>Dapper</a:t>
             </a:r>
             <a:endParaRPr lang="zh-TW" altLang="en-US" sz="4800" dirty="0"/>
@@ -6914,7 +6912,7 @@
           <a:lstStyle/>
           <a:p>
             <a:r>
-              <a:rPr lang="en-US" altLang="zh-TW" dirty="0" smtClean="0"/>
+              <a:rPr lang="en-US" altLang="zh-TW" dirty="0"/>
               <a:t>Query</a:t>
             </a:r>
             <a:endParaRPr lang="zh-TW" altLang="en-US" dirty="0"/>
@@ -6939,195 +6937,182 @@
           <a:lstStyle/>
           <a:p>
             <a:r>
-              <a:rPr lang="zh-TW" altLang="en-US" dirty="0" smtClean="0"/>
+              <a:rPr lang="zh-TW" altLang="en-US" dirty="0"/>
               <a:t>用 </a:t>
             </a:r>
             <a:r>
-              <a:rPr lang="en-US" altLang="zh-TW" dirty="0" err="1" smtClean="0"/>
+              <a:rPr lang="en-US" altLang="zh-TW" dirty="0" err="1"/>
               <a:t>IsAnsi</a:t>
             </a:r>
             <a:r>
-              <a:rPr lang="en-US" altLang="zh-TW" dirty="0" smtClean="0"/>
+              <a:rPr lang="en-US" altLang="zh-TW" dirty="0"/>
               <a:t> </a:t>
             </a:r>
             <a:r>
               <a:rPr lang="zh-TW" altLang="en-US" dirty="0"/>
-              <a:t>控制</a:t>
-            </a:r>
-            <a:r>
-              <a:rPr lang="zh-TW" altLang="en-US" dirty="0" smtClean="0"/>
-              <a:t>查詢參數型別</a:t>
-            </a:r>
-            <a:endParaRPr lang="en-US" altLang="zh-TW" dirty="0" smtClean="0"/>
+              <a:t>控制查詢參數型別</a:t>
+            </a:r>
+            <a:endParaRPr lang="en-US" altLang="zh-TW" dirty="0"/>
           </a:p>
           <a:p>
             <a:pPr lvl="1"/>
             <a:r>
-              <a:rPr lang="en-US" altLang="zh-TW" dirty="0" smtClean="0"/>
+              <a:rPr lang="en-US" altLang="zh-TW" dirty="0"/>
               <a:t>True </a:t>
             </a:r>
             <a:r>
-              <a:rPr lang="en-US" altLang="zh-TW" dirty="0" smtClean="0">
+              <a:rPr lang="en-US" altLang="zh-TW" dirty="0">
                 <a:sym typeface="Wingdings" panose="05000000000000000000" pitchFamily="2" charset="2"/>
               </a:rPr>
               <a:t></a:t>
             </a:r>
             <a:r>
-              <a:rPr lang="en-US" altLang="zh-TW" dirty="0" smtClean="0"/>
+              <a:rPr lang="en-US" altLang="zh-TW" dirty="0"/>
               <a:t> varchar</a:t>
             </a:r>
           </a:p>
           <a:p>
             <a:pPr lvl="1"/>
             <a:r>
-              <a:rPr lang="en-US" altLang="zh-TW" dirty="0" smtClean="0"/>
+              <a:rPr lang="en-US" altLang="zh-TW" dirty="0"/>
               <a:t>False (default) </a:t>
             </a:r>
             <a:r>
-              <a:rPr lang="en-US" altLang="zh-TW" dirty="0" smtClean="0">
+              <a:rPr lang="en-US" altLang="zh-TW" dirty="0">
                 <a:sym typeface="Wingdings" panose="05000000000000000000" pitchFamily="2" charset="2"/>
               </a:rPr>
               <a:t></a:t>
             </a:r>
             <a:r>
-              <a:rPr lang="en-US" altLang="zh-TW" dirty="0" smtClean="0"/>
+              <a:rPr lang="en-US" altLang="zh-TW" dirty="0"/>
               <a:t> </a:t>
             </a:r>
             <a:r>
-              <a:rPr lang="en-US" altLang="zh-TW" dirty="0" err="1" smtClean="0"/>
+              <a:rPr lang="en-US" altLang="zh-TW" dirty="0" err="1"/>
               <a:t>nvarchar</a:t>
             </a:r>
-            <a:endParaRPr lang="en-US" altLang="zh-TW" dirty="0" smtClean="0"/>
-          </a:p>
-          <a:p>
-            <a:endParaRPr lang="en-US" altLang="zh-TW" dirty="0" smtClean="0"/>
-          </a:p>
-          <a:p>
-            <a:r>
-              <a:rPr lang="zh-TW" altLang="en-US" dirty="0" smtClean="0"/>
+            <a:endParaRPr lang="en-US" altLang="zh-TW" dirty="0"/>
+          </a:p>
+          <a:p>
+            <a:endParaRPr lang="en-US" altLang="zh-TW" dirty="0"/>
+          </a:p>
+          <a:p>
+            <a:r>
+              <a:rPr lang="zh-TW" altLang="en-US" dirty="0"/>
               <a:t>當</a:t>
             </a:r>
             <a:r>
-              <a:rPr lang="en-US" altLang="zh-TW" dirty="0" smtClean="0"/>
+              <a:rPr lang="en-US" altLang="zh-TW" dirty="0"/>
               <a:t> MSSQL column</a:t>
             </a:r>
             <a:r>
-              <a:rPr lang="zh-TW" altLang="en-US" dirty="0" smtClean="0"/>
+              <a:rPr lang="zh-TW" altLang="en-US" dirty="0"/>
               <a:t> 為</a:t>
             </a:r>
             <a:r>
-              <a:rPr lang="en-US" altLang="zh-TW" dirty="0" smtClean="0"/>
+              <a:rPr lang="en-US" altLang="zh-TW" dirty="0"/>
               <a:t> varchar </a:t>
             </a:r>
             <a:r>
-              <a:rPr lang="zh-TW" altLang="en-US" dirty="0" smtClean="0"/>
+              <a:rPr lang="zh-TW" altLang="en-US" dirty="0"/>
               <a:t>時</a:t>
             </a:r>
             <a:r>
-              <a:rPr lang="en-US" altLang="zh-TW" dirty="0" smtClean="0"/>
+              <a:rPr lang="en-US" altLang="zh-TW" dirty="0"/>
               <a:t>, </a:t>
             </a:r>
             <a:r>
-              <a:rPr lang="zh-TW" altLang="en-US" dirty="0" smtClean="0"/>
+              <a:rPr lang="zh-TW" altLang="en-US" dirty="0"/>
               <a:t>使用</a:t>
             </a:r>
             <a:r>
-              <a:rPr lang="en-US" altLang="zh-TW" dirty="0" smtClean="0"/>
+              <a:rPr lang="en-US" altLang="zh-TW" dirty="0"/>
               <a:t> </a:t>
             </a:r>
             <a:r>
-              <a:rPr lang="en-US" altLang="zh-TW" dirty="0" err="1" smtClean="0"/>
+              <a:rPr lang="en-US" altLang="zh-TW" dirty="0" err="1"/>
               <a:t>sql</a:t>
             </a:r>
             <a:r>
-              <a:rPr lang="en-US" altLang="zh-TW" dirty="0" smtClean="0"/>
+              <a:rPr lang="en-US" altLang="zh-TW" dirty="0"/>
               <a:t> script </a:t>
             </a:r>
             <a:r>
-              <a:rPr lang="zh-TW" altLang="en-US" dirty="0" smtClean="0"/>
+              <a:rPr lang="zh-TW" altLang="en-US" dirty="0"/>
               <a:t>查詢參數且型別為</a:t>
             </a:r>
             <a:r>
-              <a:rPr lang="en-US" altLang="zh-TW" dirty="0" smtClean="0"/>
+              <a:rPr lang="en-US" altLang="zh-TW" dirty="0"/>
               <a:t> </a:t>
             </a:r>
             <a:r>
-              <a:rPr lang="en-US" altLang="zh-TW" dirty="0" err="1" smtClean="0"/>
+              <a:rPr lang="en-US" altLang="zh-TW" dirty="0" err="1"/>
               <a:t>nvarchar</a:t>
             </a:r>
             <a:r>
               <a:rPr lang="en-US" altLang="zh-TW" dirty="0"/>
-              <a:t> </a:t>
-            </a:r>
-            <a:r>
-              <a:rPr lang="en-US" altLang="zh-TW" dirty="0" smtClean="0"/>
-              <a:t>, </a:t>
-            </a:r>
-            <a:r>
-              <a:rPr lang="zh-TW" altLang="en-US" dirty="0" smtClean="0"/>
+              <a:t> , </a:t>
+            </a:r>
+            <a:r>
+              <a:rPr lang="zh-TW" altLang="en-US" dirty="0"/>
               <a:t>會造成隱含轉型並影響效能</a:t>
             </a:r>
-            <a:endParaRPr lang="en-US" altLang="zh-TW" dirty="0" smtClean="0"/>
+            <a:endParaRPr lang="en-US" altLang="zh-TW" dirty="0"/>
           </a:p>
           <a:p>
             <a:pPr marL="0" indent="0">
               <a:buNone/>
             </a:pPr>
             <a:r>
-              <a:rPr lang="en-US" altLang="zh-TW" dirty="0" smtClean="0"/>
+              <a:rPr lang="en-US" altLang="zh-TW" dirty="0"/>
               <a:t>     (</a:t>
             </a:r>
             <a:r>
-              <a:rPr lang="zh-TW" altLang="en-US" dirty="0" smtClean="0"/>
+              <a:rPr lang="zh-TW" altLang="en-US" dirty="0"/>
               <a:t>若使用</a:t>
             </a:r>
             <a:r>
-              <a:rPr lang="en-US" altLang="zh-TW" dirty="0" smtClean="0"/>
+              <a:rPr lang="en-US" altLang="zh-TW" dirty="0"/>
               <a:t> SP </a:t>
             </a:r>
             <a:r>
-              <a:rPr lang="zh-TW" altLang="en-US" dirty="0" smtClean="0"/>
+              <a:rPr lang="zh-TW" altLang="en-US" dirty="0"/>
               <a:t>且有宣告 </a:t>
             </a:r>
             <a:r>
-              <a:rPr lang="en-US" altLang="zh-TW" dirty="0" smtClean="0"/>
+              <a:rPr lang="en-US" altLang="zh-TW" dirty="0"/>
               <a:t>SP </a:t>
             </a:r>
             <a:r>
-              <a:rPr lang="zh-TW" altLang="en-US" dirty="0" smtClean="0"/>
+              <a:rPr lang="zh-TW" altLang="en-US" dirty="0"/>
               <a:t>參數為</a:t>
             </a:r>
             <a:r>
-              <a:rPr lang="en-US" altLang="zh-TW" dirty="0" smtClean="0"/>
+              <a:rPr lang="en-US" altLang="zh-TW" dirty="0"/>
               <a:t> varchar, </a:t>
             </a:r>
             <a:r>
-              <a:rPr lang="zh-TW" altLang="en-US" dirty="0" smtClean="0"/>
+              <a:rPr lang="zh-TW" altLang="en-US" dirty="0"/>
               <a:t>則沒有影響</a:t>
             </a:r>
             <a:r>
-              <a:rPr lang="en-US" altLang="zh-TW" dirty="0" smtClean="0"/>
+              <a:rPr lang="en-US" altLang="zh-TW" dirty="0"/>
               <a:t>)</a:t>
             </a:r>
+          </a:p>
+          <a:p>
             <a:endParaRPr lang="en-US" altLang="zh-TW" dirty="0"/>
           </a:p>
           <a:p>
-            <a:endParaRPr lang="en-US" altLang="zh-TW" dirty="0" smtClean="0"/>
-          </a:p>
-          <a:p>
             <a:pPr marL="0" indent="0">
               <a:buNone/>
             </a:pPr>
             <a:r>
               <a:rPr lang="zh-TW" altLang="en-US" dirty="0"/>
-              <a:t>參考</a:t>
-            </a:r>
-            <a:r>
-              <a:rPr lang="zh-TW" altLang="en-US" dirty="0" smtClean="0"/>
-              <a:t>文章</a:t>
-            </a:r>
-            <a:r>
-              <a:rPr lang="en-US" altLang="zh-TW" dirty="0" smtClean="0"/>
+              <a:t>參考文章</a:t>
+            </a:r>
+            <a:r>
+              <a:rPr lang="en-US" altLang="zh-TW" dirty="0"/>
               <a:t>: </a:t>
             </a:r>
           </a:p>
@@ -7139,39 +7124,21 @@
               <a:rPr lang="en-US" altLang="zh-TW" sz="1400" dirty="0">
                 <a:hlinkClick r:id="rId2"/>
               </a:rPr>
-              <a:t>https://technet.microsoft.com/zh-tw/library/ms190309(v=sql.110).</a:t>
-            </a:r>
-            <a:r>
-              <a:rPr lang="en-US" altLang="zh-TW" sz="1400" dirty="0" smtClean="0">
-                <a:hlinkClick r:id="rId2"/>
-              </a:rPr>
-              <a:t>aspx</a:t>
-            </a:r>
-            <a:endParaRPr lang="en-US" altLang="zh-TW" sz="1400" dirty="0" smtClean="0"/>
+              <a:t>https://technet.microsoft.com/zh-tw/library/ms190309(v=sql.110).aspx</a:t>
+            </a:r>
+            <a:endParaRPr lang="en-US" altLang="zh-TW" sz="1400" dirty="0"/>
           </a:p>
           <a:p>
             <a:pPr marL="0" indent="0">
               <a:buNone/>
             </a:pPr>
-            <a:r>
-              <a:rPr lang="en-US" altLang="zh-TW" sz="1400" dirty="0" smtClean="0">
-                <a:hlinkClick r:id="rId3"/>
-              </a:rPr>
-              <a:t>https</a:t>
-            </a:r>
             <a:r>
               <a:rPr lang="en-US" altLang="zh-TW" sz="1400" dirty="0">
                 <a:hlinkClick r:id="rId3"/>
               </a:rPr>
-              <a:t>://</a:t>
-            </a:r>
-            <a:r>
-              <a:rPr lang="en-US" altLang="zh-TW" sz="1400" dirty="0" smtClean="0">
-                <a:hlinkClick r:id="rId3"/>
-              </a:rPr>
-              <a:t>dotblogs.com.tw/stanley14/2016/01/28/131740</a:t>
-            </a:r>
-            <a:endParaRPr lang="en-US" altLang="zh-TW" sz="1400" dirty="0" smtClean="0"/>
+              <a:t>https://dotblogs.com.tw/stanley14/2016/01/28/131740</a:t>
+            </a:r>
+            <a:endParaRPr lang="en-US" altLang="zh-TW" sz="1400" dirty="0"/>
           </a:p>
           <a:p>
             <a:endParaRPr lang="zh-TW" altLang="en-US" dirty="0"/>
@@ -7224,7 +7191,7 @@
           <a:lstStyle/>
           <a:p>
             <a:r>
-              <a:rPr lang="en-US" altLang="zh-TW" dirty="0" smtClean="0"/>
+              <a:rPr lang="en-US" altLang="zh-TW" dirty="0"/>
               <a:t>Query</a:t>
             </a:r>
             <a:endParaRPr lang="zh-TW" altLang="en-US" dirty="0"/>
@@ -7249,31 +7216,31 @@
           <a:lstStyle/>
           <a:p>
             <a:r>
-              <a:rPr lang="zh-TW" altLang="en-US" dirty="0" smtClean="0"/>
+              <a:rPr lang="zh-TW" altLang="en-US" dirty="0"/>
               <a:t>用</a:t>
             </a:r>
             <a:r>
-              <a:rPr lang="en-US" altLang="zh-TW" dirty="0" smtClean="0"/>
+              <a:rPr lang="en-US" altLang="zh-TW" dirty="0"/>
               <a:t> Buffered </a:t>
             </a:r>
             <a:r>
-              <a:rPr lang="zh-TW" altLang="en-US" dirty="0" smtClean="0"/>
+              <a:rPr lang="zh-TW" altLang="en-US" dirty="0"/>
               <a:t>控制</a:t>
             </a:r>
             <a:r>
-              <a:rPr lang="en-US" altLang="zh-TW" dirty="0" smtClean="0"/>
+              <a:rPr lang="en-US" altLang="zh-TW" dirty="0"/>
               <a:t> reader </a:t>
             </a:r>
             <a:r>
-              <a:rPr lang="zh-TW" altLang="en-US" dirty="0" smtClean="0"/>
+              <a:rPr lang="zh-TW" altLang="en-US" dirty="0"/>
               <a:t>讀取行為</a:t>
             </a:r>
-            <a:endParaRPr lang="en-US" altLang="zh-TW" dirty="0" smtClean="0"/>
+            <a:endParaRPr lang="en-US" altLang="zh-TW" dirty="0"/>
           </a:p>
           <a:p>
             <a:pPr lvl="1"/>
             <a:r>
-              <a:rPr lang="en-US" altLang="zh-TW" dirty="0" smtClean="0"/>
+              <a:rPr lang="en-US" altLang="zh-TW" dirty="0"/>
               <a:t>True (default) </a:t>
             </a:r>
             <a:endParaRPr lang="en-US" altLang="zh-TW" dirty="0">
@@ -7285,36 +7252,36 @@
               <a:buNone/>
             </a:pPr>
             <a:r>
-              <a:rPr lang="zh-TW" altLang="en-US" dirty="0" smtClean="0">
+              <a:rPr lang="zh-TW" altLang="en-US" dirty="0">
                 <a:sym typeface="Wingdings" panose="05000000000000000000" pitchFamily="2" charset="2"/>
               </a:rPr>
               <a:t>一次將所有資料讀進記憶體</a:t>
             </a:r>
             <a:r>
-              <a:rPr lang="en-US" altLang="zh-TW" dirty="0" smtClean="0">
+              <a:rPr lang="en-US" altLang="zh-TW" dirty="0">
                 <a:sym typeface="Wingdings" panose="05000000000000000000" pitchFamily="2" charset="2"/>
               </a:rPr>
               <a:t>, </a:t>
             </a:r>
             <a:r>
-              <a:rPr lang="zh-TW" altLang="en-US" dirty="0" smtClean="0">
+              <a:rPr lang="zh-TW" altLang="en-US" dirty="0">
                 <a:sym typeface="Wingdings" panose="05000000000000000000" pitchFamily="2" charset="2"/>
               </a:rPr>
               <a:t>讀完</a:t>
             </a:r>
             <a:r>
-              <a:rPr lang="en-US" altLang="zh-TW" dirty="0" smtClean="0">
+              <a:rPr lang="en-US" altLang="zh-TW" dirty="0">
                 <a:sym typeface="Wingdings" panose="05000000000000000000" pitchFamily="2" charset="2"/>
               </a:rPr>
               <a:t> connection </a:t>
             </a:r>
             <a:r>
-              <a:rPr lang="zh-TW" altLang="en-US" dirty="0" smtClean="0">
+              <a:rPr lang="zh-TW" altLang="en-US" dirty="0">
                 <a:sym typeface="Wingdings" panose="05000000000000000000" pitchFamily="2" charset="2"/>
               </a:rPr>
               <a:t>就會關起來</a:t>
             </a:r>
-            <a:endParaRPr lang="en-US" altLang="zh-TW" dirty="0" smtClean="0">
+            <a:endParaRPr lang="en-US" altLang="zh-TW" dirty="0">
               <a:sym typeface="Wingdings" panose="05000000000000000000" pitchFamily="2" charset="2"/>
             </a:endParaRPr>
           </a:p>
@@ -7322,14 +7289,14 @@
             <a:pPr marL="457200" lvl="1" indent="0">
               <a:buNone/>
             </a:pPr>
-            <a:endParaRPr lang="en-US" altLang="zh-TW" dirty="0" smtClean="0">
+            <a:endParaRPr lang="en-US" altLang="zh-TW" dirty="0">
               <a:sym typeface="Wingdings" panose="05000000000000000000" pitchFamily="2" charset="2"/>
             </a:endParaRPr>
           </a:p>
           <a:p>
             <a:pPr lvl="1"/>
             <a:r>
-              <a:rPr lang="en-US" altLang="zh-TW" dirty="0" smtClean="0">
+              <a:rPr lang="en-US" altLang="zh-TW" dirty="0">
                 <a:sym typeface="Wingdings" panose="05000000000000000000" pitchFamily="2" charset="2"/>
               </a:rPr>
               <a:t>False </a:t>
@@ -7340,31 +7307,31 @@
               <a:buNone/>
             </a:pPr>
             <a:r>
-              <a:rPr lang="zh-TW" altLang="en-US" dirty="0" smtClean="0">
+              <a:rPr lang="zh-TW" altLang="en-US" dirty="0">
                 <a:sym typeface="Wingdings" panose="05000000000000000000" pitchFamily="2" charset="2"/>
               </a:rPr>
               <a:t>逐筆讀取</a:t>
             </a:r>
             <a:r>
-              <a:rPr lang="en-US" altLang="zh-TW" dirty="0" smtClean="0">
+              <a:rPr lang="en-US" altLang="zh-TW" dirty="0">
                 <a:sym typeface="Wingdings" panose="05000000000000000000" pitchFamily="2" charset="2"/>
               </a:rPr>
               <a:t>, </a:t>
             </a:r>
             <a:r>
-              <a:rPr lang="zh-TW" altLang="en-US" dirty="0" smtClean="0">
+              <a:rPr lang="zh-TW" altLang="en-US" dirty="0">
                 <a:sym typeface="Wingdings" panose="05000000000000000000" pitchFamily="2" charset="2"/>
               </a:rPr>
               <a:t>記憶體用量較小</a:t>
             </a:r>
             <a:r>
-              <a:rPr lang="en-US" altLang="zh-TW" dirty="0" smtClean="0">
+              <a:rPr lang="en-US" altLang="zh-TW" dirty="0">
                 <a:sym typeface="Wingdings" panose="05000000000000000000" pitchFamily="2" charset="2"/>
               </a:rPr>
               <a:t>, </a:t>
             </a:r>
             <a:r>
-              <a:rPr lang="zh-TW" altLang="en-US" dirty="0" smtClean="0">
+              <a:rPr lang="zh-TW" altLang="en-US" dirty="0">
                 <a:sym typeface="Wingdings" panose="05000000000000000000" pitchFamily="2" charset="2"/>
               </a:rPr>
               <a:t>會占用</a:t>
@@ -7373,39 +7340,33 @@
               <a:rPr lang="en-US" altLang="zh-TW" dirty="0">
                 <a:sym typeface="Wingdings" panose="05000000000000000000" pitchFamily="2" charset="2"/>
               </a:rPr>
-              <a:t> </a:t>
-            </a:r>
-            <a:r>
-              <a:rPr lang="en-US" altLang="zh-TW" dirty="0" smtClean="0">
-                <a:sym typeface="Wingdings" panose="05000000000000000000" pitchFamily="2" charset="2"/>
-              </a:rPr>
-              <a:t>connection</a:t>
-            </a:r>
-            <a:r>
-              <a:rPr lang="zh-TW" altLang="en-US" dirty="0" smtClean="0">
+              <a:t> connection</a:t>
+            </a:r>
+            <a:r>
+              <a:rPr lang="zh-TW" altLang="en-US" dirty="0">
                 <a:sym typeface="Wingdings" panose="05000000000000000000" pitchFamily="2" charset="2"/>
               </a:rPr>
               <a:t> 直到全部讀取完成</a:t>
             </a:r>
             <a:r>
-              <a:rPr lang="en-US" altLang="zh-TW" dirty="0" smtClean="0">
+              <a:rPr lang="en-US" altLang="zh-TW" dirty="0">
                 <a:sym typeface="Wingdings" panose="05000000000000000000" pitchFamily="2" charset="2"/>
               </a:rPr>
               <a:t>, </a:t>
             </a:r>
             <a:r>
-              <a:rPr lang="zh-TW" altLang="en-US" dirty="0" smtClean="0">
+              <a:rPr lang="zh-TW" altLang="en-US" dirty="0">
                 <a:sym typeface="Wingdings" panose="05000000000000000000" pitchFamily="2" charset="2"/>
               </a:rPr>
               <a:t>通常是讀取非常巨量的資料才會使用</a:t>
             </a:r>
-            <a:endParaRPr lang="en-US" altLang="zh-TW" dirty="0" smtClean="0"/>
+            <a:endParaRPr lang="en-US" altLang="zh-TW" dirty="0"/>
           </a:p>
           <a:p>
             <a:pPr marL="457200" lvl="1" indent="0">
               <a:buNone/>
             </a:pPr>
-            <a:endParaRPr lang="en-US" altLang="zh-TW" dirty="0" smtClean="0"/>
+            <a:endParaRPr lang="en-US" altLang="zh-TW" dirty="0"/>
           </a:p>
           <a:p>
             <a:pPr marL="457200" lvl="1" indent="0">
@@ -7424,25 +7385,13 @@
             <a:pPr marL="457200" lvl="1" indent="0">
               <a:buNone/>
             </a:pPr>
-            <a:r>
-              <a:rPr lang="en-US" altLang="zh-TW" dirty="0" smtClean="0">
-                <a:hlinkClick r:id="rId2"/>
-              </a:rPr>
-              <a:t>http</a:t>
-            </a:r>
             <a:r>
               <a:rPr lang="en-US" altLang="zh-TW" dirty="0">
                 <a:hlinkClick r:id="rId2"/>
               </a:rPr>
-              <a:t>://</a:t>
-            </a:r>
-            <a:r>
-              <a:rPr lang="en-US" altLang="zh-TW" dirty="0" smtClean="0">
-                <a:hlinkClick r:id="rId2"/>
-              </a:rPr>
-              <a:t>dapper-tutorial.net/buffered</a:t>
-            </a:r>
-            <a:endParaRPr lang="en-US" altLang="zh-TW" dirty="0" smtClean="0"/>
+              <a:t>http://dapper-tutorial.net/buffered</a:t>
+            </a:r>
+            <a:endParaRPr lang="en-US" altLang="zh-TW" dirty="0"/>
           </a:p>
           <a:p>
             <a:pPr marL="457200" lvl="1" indent="0">
@@ -7452,15 +7401,9 @@
               <a:rPr lang="en-US" altLang="zh-TW" dirty="0">
                 <a:hlinkClick r:id="rId3"/>
               </a:rPr>
-              <a:t>https://</a:t>
-            </a:r>
-            <a:r>
-              <a:rPr lang="en-US" altLang="zh-TW" dirty="0" smtClean="0">
-                <a:hlinkClick r:id="rId3"/>
-              </a:rPr>
-              <a:t>stackoverflow.com/a/13026708</a:t>
-            </a:r>
-            <a:endParaRPr lang="en-US" altLang="zh-TW" dirty="0" smtClean="0"/>
+              <a:t>https://stackoverflow.com/a/13026708</a:t>
+            </a:r>
+            <a:endParaRPr lang="en-US" altLang="zh-TW" dirty="0"/>
           </a:p>
           <a:p>
             <a:pPr marL="457200" lvl="1" indent="0">
@@ -7470,7 +7413,7 @@
           </a:p>
           <a:p>
             <a:pPr lvl="1"/>
-            <a:endParaRPr lang="en-US" altLang="zh-TW" dirty="0" smtClean="0"/>
+            <a:endParaRPr lang="en-US" altLang="zh-TW" dirty="0"/>
           </a:p>
         </p:txBody>
       </p:sp>
@@ -7520,7 +7463,7 @@
           <a:lstStyle/>
           <a:p>
             <a:r>
-              <a:rPr lang="en-US" altLang="zh-TW" dirty="0" smtClean="0"/>
+              <a:rPr lang="en-US" altLang="zh-TW" dirty="0"/>
               <a:t>CRUD</a:t>
             </a:r>
             <a:endParaRPr lang="zh-TW" altLang="en-US" dirty="0"/>
@@ -7543,11 +7486,11 @@
           <a:lstStyle/>
           <a:p>
             <a:r>
-              <a:rPr lang="en-US" altLang="zh-TW" dirty="0" err="1" smtClean="0"/>
+              <a:rPr lang="en-US" altLang="zh-TW" dirty="0" err="1"/>
               <a:t>GetAll</a:t>
             </a:r>
             <a:r>
-              <a:rPr lang="en-US" altLang="zh-TW" dirty="0" smtClean="0"/>
+              <a:rPr lang="en-US" altLang="zh-TW" dirty="0"/>
               <a:t>&lt;T&gt;</a:t>
             </a:r>
           </a:p>
@@ -7556,23 +7499,22 @@
               <a:rPr lang="en-US" altLang="zh-TW" dirty="0"/>
               <a:t>Execute</a:t>
             </a:r>
-            <a:endParaRPr lang="en-US" altLang="zh-TW" dirty="0" smtClean="0"/>
-          </a:p>
-          <a:p>
-            <a:r>
-              <a:rPr lang="en-US" altLang="zh-TW" dirty="0" smtClean="0"/>
+          </a:p>
+          <a:p>
+            <a:r>
+              <a:rPr lang="en-US" altLang="zh-TW" dirty="0"/>
               <a:t>Update</a:t>
             </a:r>
           </a:p>
           <a:p>
             <a:r>
-              <a:rPr lang="en-US" altLang="zh-TW" dirty="0" smtClean="0"/>
+              <a:rPr lang="en-US" altLang="zh-TW" dirty="0"/>
               <a:t>Insert</a:t>
             </a:r>
           </a:p>
           <a:p>
             <a:r>
-              <a:rPr lang="en-US" altLang="zh-TW" dirty="0" smtClean="0"/>
+              <a:rPr lang="en-US" altLang="zh-TW" dirty="0"/>
               <a:t>Transaction</a:t>
             </a:r>
           </a:p>
@@ -7630,16 +7572,12 @@
           <a:lstStyle/>
           <a:p>
             <a:r>
-              <a:rPr lang="en-US" altLang="zh-TW" dirty="0" err="1" smtClean="0"/>
+              <a:rPr lang="en-US" altLang="zh-TW" dirty="0" err="1"/>
               <a:t>Dapper.Contrib</a:t>
             </a:r>
             <a:r>
-              <a:rPr lang="en-US" altLang="zh-TW" dirty="0" smtClean="0"/>
-              <a:t> - </a:t>
-            </a:r>
-            <a:r>
-              <a:rPr lang="en-US" altLang="zh-TW" dirty="0"/>
-              <a:t>Attributes</a:t>
+              <a:rPr lang="en-US" altLang="zh-TW" dirty="0"/>
+              <a:t> - Attributes</a:t>
             </a:r>
           </a:p>
         </p:txBody>
@@ -7667,109 +7605,105 @@
           <a:lstStyle/>
           <a:p>
             <a:r>
-              <a:rPr lang="en-US" altLang="zh-TW" dirty="0" smtClean="0"/>
+              <a:rPr lang="en-US" altLang="zh-TW" dirty="0"/>
               <a:t>Table</a:t>
             </a:r>
           </a:p>
           <a:p>
             <a:pPr lvl="1"/>
             <a:r>
-              <a:rPr lang="zh-TW" altLang="en-US" sz="1400" dirty="0" smtClean="0"/>
+              <a:rPr lang="zh-TW" altLang="en-US" sz="1400" dirty="0"/>
               <a:t>指定</a:t>
             </a:r>
             <a:r>
               <a:rPr lang="en-US" altLang="zh-TW" sz="1400" dirty="0"/>
-              <a:t> </a:t>
-            </a:r>
-            <a:r>
-              <a:rPr lang="en-US" altLang="zh-TW" sz="1400" dirty="0" smtClean="0"/>
-              <a:t>Table </a:t>
-            </a:r>
-            <a:r>
-              <a:rPr lang="zh-TW" altLang="en-US" sz="1400" dirty="0" smtClean="0"/>
+              <a:t> Table </a:t>
+            </a:r>
+            <a:r>
+              <a:rPr lang="zh-TW" altLang="en-US" sz="1400" dirty="0"/>
               <a:t>名稱</a:t>
             </a:r>
-            <a:endParaRPr lang="en-US" altLang="zh-TW" sz="1400" dirty="0" smtClean="0"/>
-          </a:p>
-          <a:p>
-            <a:r>
-              <a:rPr lang="en-US" altLang="zh-TW" dirty="0" smtClean="0"/>
+            <a:endParaRPr lang="en-US" altLang="zh-TW" sz="1400" dirty="0"/>
+          </a:p>
+          <a:p>
+            <a:r>
+              <a:rPr lang="en-US" altLang="zh-TW" dirty="0"/>
               <a:t>Key</a:t>
             </a:r>
           </a:p>
           <a:p>
             <a:pPr lvl="1"/>
             <a:r>
-              <a:rPr lang="zh-TW" altLang="en-US" sz="1400" dirty="0" smtClean="0"/>
+              <a:rPr lang="zh-TW" altLang="en-US" sz="1400" dirty="0"/>
               <a:t>標記此屬性為</a:t>
             </a:r>
             <a:r>
-              <a:rPr lang="en-US" altLang="zh-TW" sz="1400" dirty="0" smtClean="0"/>
+              <a:rPr lang="en-US" altLang="zh-TW" sz="1400" dirty="0"/>
               <a:t> PK , </a:t>
             </a:r>
             <a:r>
-              <a:rPr lang="zh-TW" altLang="en-US" sz="1400" dirty="0" smtClean="0"/>
+              <a:rPr lang="zh-TW" altLang="en-US" sz="1400" dirty="0"/>
               <a:t>並會使用資料庫自動編號</a:t>
             </a:r>
             <a:r>
-              <a:rPr lang="en-US" altLang="zh-TW" sz="1400" dirty="0" smtClean="0"/>
+              <a:rPr lang="en-US" altLang="zh-TW" sz="1400" dirty="0"/>
               <a:t>, </a:t>
             </a:r>
             <a:r>
-              <a:rPr lang="zh-TW" altLang="en-US" sz="1400" dirty="0" smtClean="0"/>
+              <a:rPr lang="zh-TW" altLang="en-US" sz="1400" dirty="0"/>
               <a:t>故</a:t>
             </a:r>
             <a:r>
-              <a:rPr lang="en-US" altLang="zh-TW" sz="1400" dirty="0" smtClean="0"/>
+              <a:rPr lang="en-US" altLang="zh-TW" sz="1400" dirty="0"/>
               <a:t>Insert()</a:t>
             </a:r>
             <a:r>
-              <a:rPr lang="zh-TW" altLang="en-US" sz="1400" dirty="0" smtClean="0"/>
+              <a:rPr lang="zh-TW" altLang="en-US" sz="1400" dirty="0"/>
               <a:t>不會包含此欄位</a:t>
             </a:r>
-            <a:endParaRPr lang="en-US" altLang="zh-TW" sz="1400" dirty="0" smtClean="0"/>
-          </a:p>
-          <a:p>
-            <a:r>
-              <a:rPr lang="en-US" altLang="zh-TW" dirty="0" err="1" smtClean="0"/>
+            <a:endParaRPr lang="en-US" altLang="zh-TW" sz="1400" dirty="0"/>
+          </a:p>
+          <a:p>
+            <a:r>
+              <a:rPr lang="en-US" altLang="zh-TW" dirty="0" err="1"/>
               <a:t>ExplicitKey</a:t>
             </a:r>
-            <a:endParaRPr lang="en-US" altLang="zh-TW" dirty="0" smtClean="0"/>
+            <a:endParaRPr lang="en-US" altLang="zh-TW" dirty="0"/>
           </a:p>
           <a:p>
             <a:pPr lvl="1"/>
             <a:r>
-              <a:rPr lang="zh-TW" altLang="en-US" sz="1400" dirty="0" smtClean="0"/>
+              <a:rPr lang="zh-TW" altLang="en-US" sz="1400" dirty="0"/>
               <a:t>標記此屬性為</a:t>
             </a:r>
             <a:r>
-              <a:rPr lang="en-US" altLang="zh-TW" sz="1400" dirty="0" smtClean="0"/>
+              <a:rPr lang="en-US" altLang="zh-TW" sz="1400" dirty="0"/>
               <a:t> PK , </a:t>
             </a:r>
             <a:r>
-              <a:rPr lang="zh-TW" altLang="en-US" sz="1400" dirty="0" smtClean="0"/>
+              <a:rPr lang="zh-TW" altLang="en-US" sz="1400" dirty="0"/>
               <a:t>但不使用資料庫自動編號</a:t>
             </a:r>
             <a:r>
-              <a:rPr lang="en-US" altLang="zh-TW" sz="1400" dirty="0" smtClean="0"/>
+              <a:rPr lang="en-US" altLang="zh-TW" sz="1400" dirty="0"/>
               <a:t>, </a:t>
             </a:r>
             <a:r>
-              <a:rPr lang="zh-TW" altLang="en-US" sz="1400" dirty="0" smtClean="0"/>
+              <a:rPr lang="zh-TW" altLang="en-US" sz="1400" dirty="0"/>
               <a:t>會由程式賦予值</a:t>
             </a:r>
-            <a:endParaRPr lang="en-US" altLang="zh-TW" sz="1400" dirty="0" smtClean="0"/>
-          </a:p>
-          <a:p>
-            <a:r>
-              <a:rPr lang="en-US" altLang="zh-TW" dirty="0" smtClean="0"/>
+            <a:endParaRPr lang="en-US" altLang="zh-TW" sz="1400" dirty="0"/>
+          </a:p>
+          <a:p>
+            <a:r>
+              <a:rPr lang="en-US" altLang="zh-TW" dirty="0"/>
               <a:t>Write</a:t>
             </a:r>
           </a:p>
           <a:p>
             <a:pPr lvl="1"/>
             <a:r>
-              <a:rPr lang="zh-TW" altLang="en-US" sz="1400" dirty="0" smtClean="0"/>
+              <a:rPr lang="zh-TW" altLang="en-US" sz="1400" dirty="0"/>
               <a:t>標記此屬性不寫入資料庫</a:t>
             </a:r>
             <a:endParaRPr lang="en-US" altLang="zh-TW" sz="1400" dirty="0"/>
@@ -7777,67 +7711,66 @@
           <a:p>
             <a:pPr lvl="1"/>
             <a:r>
-              <a:rPr lang="zh-TW" altLang="en-US" sz="1400" dirty="0" smtClean="0"/>
+              <a:rPr lang="zh-TW" altLang="en-US" sz="1400" dirty="0"/>
               <a:t>為 </a:t>
             </a:r>
             <a:r>
-              <a:rPr lang="en-US" altLang="zh-TW" sz="1400" dirty="0" smtClean="0"/>
+              <a:rPr lang="en-US" altLang="zh-TW" sz="1400" dirty="0"/>
               <a:t>false </a:t>
             </a:r>
             <a:r>
-              <a:rPr lang="zh-TW" altLang="en-US" sz="1400" dirty="0" smtClean="0"/>
+              <a:rPr lang="zh-TW" altLang="en-US" sz="1400" dirty="0"/>
               <a:t>時不會被存入</a:t>
             </a:r>
             <a:r>
-              <a:rPr lang="en-US" altLang="zh-TW" sz="1400" dirty="0" smtClean="0"/>
+              <a:rPr lang="en-US" altLang="zh-TW" sz="1400" dirty="0"/>
               <a:t> Dapper cache</a:t>
             </a:r>
           </a:p>
           <a:p>
             <a:r>
-              <a:rPr lang="en-US" altLang="zh-TW" dirty="0" smtClean="0"/>
+              <a:rPr lang="en-US" altLang="zh-TW" dirty="0"/>
               <a:t>Computed</a:t>
             </a:r>
           </a:p>
           <a:p>
             <a:pPr lvl="1"/>
             <a:r>
-              <a:rPr lang="zh-TW" altLang="en-US" sz="1400" dirty="0" smtClean="0"/>
+              <a:rPr lang="zh-TW" altLang="en-US" sz="1400" dirty="0"/>
               <a:t>標記此屬性為計算出來的屬性，不寫入資料庫</a:t>
             </a:r>
-            <a:endParaRPr lang="en-US" altLang="zh-TW" sz="1400" dirty="0" smtClean="0"/>
+            <a:endParaRPr lang="en-US" altLang="zh-TW" sz="1400" dirty="0"/>
           </a:p>
           <a:p>
             <a:pPr marL="514350" lvl="1" indent="0">
               <a:buNone/>
             </a:pPr>
-            <a:endParaRPr lang="en-US" altLang="zh-TW" sz="1400" dirty="0" smtClean="0"/>
+            <a:endParaRPr lang="en-US" altLang="zh-TW" sz="1400" dirty="0"/>
           </a:p>
           <a:p>
             <a:pPr marL="514350" lvl="1" indent="0">
               <a:buNone/>
             </a:pPr>
             <a:r>
-              <a:rPr lang="zh-TW" altLang="en-US" sz="1400" b="1" dirty="0" smtClean="0"/>
+              <a:rPr lang="zh-TW" altLang="en-US" sz="1400" b="1" dirty="0"/>
               <a:t>注意</a:t>
             </a:r>
             <a:r>
-              <a:rPr lang="en-US" altLang="zh-TW" sz="1400" b="1" dirty="0" smtClean="0"/>
+              <a:rPr lang="en-US" altLang="zh-TW" sz="1400" b="1" dirty="0"/>
               <a:t> namespace </a:t>
             </a:r>
             <a:r>
-              <a:rPr lang="zh-TW" altLang="en-US" sz="1400" b="1" dirty="0" smtClean="0"/>
+              <a:rPr lang="zh-TW" altLang="en-US" sz="1400" b="1" dirty="0"/>
               <a:t>是 </a:t>
             </a:r>
             <a:r>
-              <a:rPr lang="en-US" altLang="zh-TW" sz="1400" b="1" dirty="0" err="1" smtClean="0"/>
+              <a:rPr lang="en-US" altLang="zh-TW" sz="1400" b="1" dirty="0" err="1"/>
               <a:t>Dapper.Contrib.Extensions</a:t>
             </a:r>
             <a:r>
-              <a:rPr lang="en-US" altLang="zh-TW" sz="1400" b="1" dirty="0" smtClean="0"/>
+              <a:rPr lang="en-US" altLang="zh-TW" sz="1400" b="1" dirty="0"/>
               <a:t>;</a:t>
             </a:r>
-            <a:endParaRPr lang="en-US" altLang="zh-TW" sz="1400" b="1" dirty="0"/>
           </a:p>
         </p:txBody>
       </p:sp>
@@ -7887,18 +7820,13 @@
           <a:lstStyle/>
           <a:p>
             <a:r>
-              <a:rPr lang="en-US" altLang="zh-TW" dirty="0" err="1" smtClean="0"/>
+              <a:rPr lang="en-US" altLang="zh-TW" dirty="0" err="1"/>
               <a:t>Dapper.Contrib</a:t>
             </a:r>
             <a:r>
               <a:rPr lang="en-US" altLang="zh-TW" dirty="0"/>
-              <a:t> </a:t>
-            </a:r>
-            <a:r>
-              <a:rPr lang="en-US" altLang="zh-TW" dirty="0" smtClean="0"/>
-              <a:t>- Assumptions</a:t>
-            </a:r>
-            <a:endParaRPr lang="en-US" altLang="zh-TW" dirty="0"/>
+              <a:t> - Assumptions</a:t>
+            </a:r>
           </a:p>
         </p:txBody>
       </p:sp>
@@ -7925,7 +7853,7 @@
           <a:lstStyle/>
           <a:p>
             <a:r>
-              <a:rPr lang="en-US" altLang="zh-TW" b="1" dirty="0" err="1" smtClean="0"/>
+              <a:rPr lang="en-US" altLang="zh-TW" b="1" dirty="0" err="1"/>
               <a:t>TableName</a:t>
             </a:r>
             <a:endParaRPr lang="en-US" altLang="zh-TW" b="1" dirty="0"/>
@@ -7933,66 +7861,66 @@
           <a:p>
             <a:pPr lvl="1"/>
             <a:r>
-              <a:rPr lang="en-US" altLang="zh-TW" b="1" dirty="0" smtClean="0"/>
+              <a:rPr lang="en-US" altLang="zh-TW" b="1" dirty="0"/>
               <a:t>If no </a:t>
             </a:r>
             <a:r>
-              <a:rPr lang="en-US" altLang="zh-TW" b="1" dirty="0" err="1" smtClean="0"/>
+              <a:rPr lang="en-US" altLang="zh-TW" b="1" dirty="0" err="1"/>
               <a:t>TableAttibute</a:t>
             </a:r>
             <a:r>
-              <a:rPr lang="en-US" altLang="zh-TW" b="1" dirty="0" smtClean="0"/>
+              <a:rPr lang="en-US" altLang="zh-TW" b="1" dirty="0"/>
               <a:t> found</a:t>
             </a:r>
           </a:p>
           <a:p>
             <a:pPr lvl="1"/>
             <a:r>
-              <a:rPr lang="en-US" altLang="zh-TW" b="1" dirty="0" err="1" smtClean="0"/>
+              <a:rPr lang="en-US" altLang="zh-TW" b="1" dirty="0" err="1"/>
               <a:t>ClassName</a:t>
             </a:r>
             <a:r>
-              <a:rPr lang="en-US" altLang="zh-TW" b="1" dirty="0" smtClean="0"/>
+              <a:rPr lang="en-US" altLang="zh-TW" b="1" dirty="0"/>
               <a:t> + “s”</a:t>
             </a:r>
           </a:p>
           <a:p>
             <a:pPr lvl="1"/>
-            <a:endParaRPr lang="en-US" altLang="zh-TW" b="1" dirty="0" smtClean="0"/>
-          </a:p>
-          <a:p>
-            <a:r>
-              <a:rPr lang="en-US" altLang="zh-TW" b="1" dirty="0" smtClean="0"/>
+            <a:endParaRPr lang="en-US" altLang="zh-TW" b="1" dirty="0"/>
+          </a:p>
+          <a:p>
+            <a:r>
+              <a:rPr lang="en-US" altLang="zh-TW" b="1" dirty="0"/>
               <a:t>PK</a:t>
             </a:r>
           </a:p>
           <a:p>
             <a:pPr lvl="1"/>
             <a:r>
-              <a:rPr lang="en-US" altLang="zh-TW" b="1" dirty="0" smtClean="0"/>
+              <a:rPr lang="en-US" altLang="zh-TW" b="1" dirty="0"/>
               <a:t>If no any </a:t>
             </a:r>
             <a:r>
-              <a:rPr lang="en-US" altLang="zh-TW" b="1" dirty="0" err="1" smtClean="0"/>
+              <a:rPr lang="en-US" altLang="zh-TW" b="1" dirty="0" err="1"/>
               <a:t>KeyAttribute</a:t>
             </a:r>
             <a:r>
-              <a:rPr lang="en-US" altLang="zh-TW" b="1" dirty="0" smtClean="0"/>
+              <a:rPr lang="en-US" altLang="zh-TW" b="1" dirty="0"/>
               <a:t> found</a:t>
             </a:r>
           </a:p>
           <a:p>
             <a:pPr lvl="1"/>
             <a:r>
-              <a:rPr lang="en-US" altLang="zh-TW" b="1" dirty="0" smtClean="0"/>
+              <a:rPr lang="en-US" altLang="zh-TW" b="1" dirty="0"/>
               <a:t>Property name == “id” (</a:t>
             </a:r>
             <a:r>
-              <a:rPr lang="zh-TW" altLang="en-US" b="1" dirty="0" smtClean="0"/>
+              <a:rPr lang="zh-TW" altLang="en-US" b="1" dirty="0"/>
               <a:t>不分大小寫</a:t>
             </a:r>
             <a:r>
-              <a:rPr lang="en-US" altLang="zh-TW" b="1" dirty="0" smtClean="0"/>
+              <a:rPr lang="en-US" altLang="zh-TW" b="1" dirty="0"/>
               <a:t>)</a:t>
             </a:r>
           </a:p>
@@ -8000,25 +7928,20 @@
             <a:pPr lvl="1"/>
             <a:r>
               <a:rPr lang="zh-TW" altLang="en-US" b="1" dirty="0"/>
-              <a:t>將</a:t>
-            </a:r>
-            <a:r>
-              <a:rPr lang="zh-TW" altLang="en-US" b="1" dirty="0" smtClean="0"/>
-              <a:t>此 </a:t>
-            </a:r>
-            <a:r>
-              <a:rPr lang="en-US" altLang="zh-TW" b="1" dirty="0" smtClean="0"/>
+              <a:t>將此 </a:t>
+            </a:r>
+            <a:r>
+              <a:rPr lang="en-US" altLang="zh-TW" b="1" dirty="0"/>
               <a:t>id property </a:t>
             </a:r>
             <a:r>
-              <a:rPr lang="zh-TW" altLang="en-US" b="1" dirty="0" smtClean="0"/>
+              <a:rPr lang="zh-TW" altLang="en-US" b="1" dirty="0"/>
               <a:t>視為 </a:t>
             </a:r>
             <a:r>
-              <a:rPr lang="en-US" altLang="zh-TW" b="1" dirty="0" smtClean="0"/>
+              <a:rPr lang="en-US" altLang="zh-TW" b="1" dirty="0"/>
               <a:t>[Key]</a:t>
             </a:r>
-            <a:endParaRPr lang="en-US" altLang="zh-TW" b="1" dirty="0"/>
           </a:p>
         </p:txBody>
       </p:sp>
@@ -8085,12 +8008,27 @@
             <p:ph idx="1"/>
           </p:nvPr>
         </p:nvSpPr>
-        <p:spPr/>
+        <p:spPr>
+          <a:xfrm>
+            <a:off x="609598" y="1488613"/>
+            <a:ext cx="6347714" cy="3880773"/>
+          </a:xfrm>
+        </p:spPr>
         <p:txBody>
           <a:bodyPr/>
           <a:lstStyle/>
           <a:p>
-            <a:endParaRPr lang="zh-TW" altLang="en-US"/>
+            <a:r>
+              <a:rPr lang="en-US" altLang="zh-TW" dirty="0"/>
+              <a:t>Dapper 1.50.4</a:t>
+            </a:r>
+          </a:p>
+          <a:p>
+            <a:r>
+              <a:rPr lang="en-US" altLang="zh-TW" dirty="0"/>
+              <a:t>EF Core 2.0.2</a:t>
+            </a:r>
+            <a:endParaRPr lang="zh-TW" altLang="en-US" dirty="0"/>
           </a:p>
         </p:txBody>
       </p:sp>
@@ -8117,8 +8055,8 @@
         </p:blipFill>
         <p:spPr bwMode="auto">
           <a:xfrm>
-            <a:off x="179511" y="1700808"/>
-            <a:ext cx="8640961" cy="4293604"/>
+            <a:off x="395536" y="2304834"/>
+            <a:ext cx="7934948" cy="3942793"/>
           </a:xfrm>
           <a:prstGeom prst="rect">
             <a:avLst/>
@@ -8170,7 +8108,7 @@
           <a:graphicData uri="http://schemas.openxmlformats.org/presentationml/2006/ole">
             <mc:AlternateContent xmlns:mc="http://schemas.openxmlformats.org/markup-compatibility/2006">
               <mc:Choice xmlns:v="urn:schemas-microsoft-com:vml" Requires="v">
-                <p:oleObj spid="_x0000_s1038" name="封裝程式殼層物件" showAsIcon="1" r:id="rId4" imgW="1506240" imgH="388440" progId="Package">
+                <p:oleObj spid="_x0000_s1040" name="封裝程式殼層物件" showAsIcon="1" r:id="rId4" imgW="1506240" imgH="388440" progId="Package">
                   <p:embed/>
                 </p:oleObj>
               </mc:Choice>
@@ -8252,13 +8190,8 @@
           <a:p>
             <a:r>
               <a:rPr lang="en-US" altLang="zh-TW" dirty="0"/>
-              <a:t>Benchmark with EF </a:t>
-            </a:r>
-            <a:r>
-              <a:rPr lang="en-US" altLang="zh-TW" dirty="0" smtClean="0"/>
-              <a:t>Core</a:t>
-            </a:r>
-            <a:endParaRPr lang="en-US" altLang="zh-TW" dirty="0"/>
+              <a:t>Benchmark with EF Core</a:t>
+            </a:r>
           </a:p>
         </p:txBody>
       </p:sp>
@@ -8288,53 +8221,33 @@
               <a:rPr lang="en-US" altLang="zh-TW" sz="2000" dirty="0"/>
               <a:t>Mean : Arithmetic mean of all measurements </a:t>
             </a:r>
-            <a:endParaRPr lang="en-US" altLang="zh-TW" sz="2000" dirty="0" smtClean="0"/>
-          </a:p>
-          <a:p>
-            <a:r>
-              <a:rPr lang="en-US" altLang="zh-TW" sz="2000" dirty="0" smtClean="0"/>
-              <a:t>Error </a:t>
-            </a:r>
+          </a:p>
+          <a:p>
             <a:r>
               <a:rPr lang="en-US" altLang="zh-TW" sz="2000" dirty="0"/>
-              <a:t>: Half of 99.9% confidence interval </a:t>
-            </a:r>
-            <a:endParaRPr lang="en-US" altLang="zh-TW" sz="2000" dirty="0" smtClean="0"/>
-          </a:p>
-          <a:p>
-            <a:r>
-              <a:rPr lang="en-US" altLang="zh-TW" sz="2000" dirty="0" err="1" smtClean="0"/>
+              <a:t>Error : Half of 99.9% confidence interval </a:t>
+            </a:r>
+          </a:p>
+          <a:p>
+            <a:r>
+              <a:rPr lang="en-US" altLang="zh-TW" sz="2000" dirty="0" err="1"/>
               <a:t>StdDev</a:t>
             </a:r>
             <a:r>
-              <a:rPr lang="en-US" altLang="zh-TW" sz="2000" dirty="0" smtClean="0"/>
-              <a:t> </a:t>
-            </a:r>
-            <a:r>
               <a:rPr lang="en-US" altLang="zh-TW" sz="2000" dirty="0"/>
-              <a:t>: Standard deviation of all measurements </a:t>
-            </a:r>
-            <a:endParaRPr lang="en-US" altLang="zh-TW" sz="2000" dirty="0" smtClean="0"/>
-          </a:p>
-          <a:p>
-            <a:r>
-              <a:rPr lang="en-US" altLang="zh-TW" sz="2000" dirty="0" smtClean="0"/>
-              <a:t>Gen </a:t>
-            </a:r>
+              <a:t> : Standard deviation of all measurements </a:t>
+            </a:r>
+          </a:p>
+          <a:p>
             <a:r>
               <a:rPr lang="en-US" altLang="zh-TW" sz="2000" dirty="0"/>
-              <a:t>0 : GC Generation 0 collects per 1k Operations </a:t>
-            </a:r>
-            <a:endParaRPr lang="en-US" altLang="zh-TW" sz="2000" dirty="0" smtClean="0"/>
-          </a:p>
-          <a:p>
-            <a:r>
-              <a:rPr lang="en-US" altLang="zh-TW" sz="2000" dirty="0" smtClean="0"/>
-              <a:t>Allocated </a:t>
-            </a:r>
+              <a:t>Gen 0 : GC Generation 0 collects per 1k Operations </a:t>
+            </a:r>
+          </a:p>
+          <a:p>
             <a:r>
               <a:rPr lang="en-US" altLang="zh-TW" sz="2000" dirty="0"/>
-              <a:t>: Allocated memory per single operation (managed only, inclusive, 1KB = 1024B)</a:t>
+              <a:t>Allocated : Allocated memory per single operation (managed only, inclusive, 1KB = 1024B)</a:t>
             </a:r>
             <a:endParaRPr lang="en-US" altLang="zh-TW" sz="2000" b="1" dirty="0"/>
           </a:p>
@@ -8386,7 +8299,7 @@
           <a:lstStyle/>
           <a:p>
             <a:r>
-              <a:rPr lang="en-US" altLang="zh-TW" dirty="0" smtClean="0"/>
+              <a:rPr lang="en-US" altLang="zh-TW" dirty="0"/>
               <a:t>Reference</a:t>
             </a:r>
             <a:endParaRPr lang="zh-TW" altLang="en-US" dirty="0"/>
@@ -8409,16 +8322,8 @@
           <a:lstStyle/>
           <a:p>
             <a:r>
-              <a:rPr lang="en-US" altLang="zh-TW" dirty="0" smtClean="0"/>
-              <a:t>Dapper source </a:t>
-            </a:r>
-            <a:r>
-              <a:rPr lang="en-US" altLang="zh-TW" dirty="0"/>
-              <a:t>c</a:t>
-            </a:r>
-            <a:r>
-              <a:rPr lang="en-US" altLang="zh-TW" dirty="0" smtClean="0"/>
-              <a:t>ode</a:t>
+              <a:rPr lang="en-US" altLang="zh-TW" dirty="0"/>
+              <a:t>Dapper source code</a:t>
             </a:r>
           </a:p>
           <a:p>
@@ -8429,21 +8334,15 @@
               <a:rPr lang="en-US" altLang="zh-TW" dirty="0">
                 <a:hlinkClick r:id="rId2"/>
               </a:rPr>
-              <a:t>https://</a:t>
-            </a:r>
-            <a:r>
-              <a:rPr lang="en-US" altLang="zh-TW" dirty="0" smtClean="0">
-                <a:hlinkClick r:id="rId2"/>
-              </a:rPr>
-              <a:t>github.com/StackExchange/Dapper</a:t>
-            </a:r>
-            <a:endParaRPr lang="en-US" altLang="zh-TW" dirty="0" smtClean="0"/>
+              <a:t>https://github.com/StackExchange/Dapper</a:t>
+            </a:r>
+            <a:endParaRPr lang="en-US" altLang="zh-TW" dirty="0"/>
           </a:p>
           <a:p>
             <a:pPr marL="0" indent="0">
               <a:buNone/>
             </a:pPr>
-            <a:endParaRPr lang="en-US" altLang="zh-TW" dirty="0" smtClean="0"/>
+            <a:endParaRPr lang="en-US" altLang="zh-TW" dirty="0"/>
           </a:p>
           <a:p>
             <a:pPr lvl="0">
@@ -8452,7 +8351,7 @@
               </a:buClr>
             </a:pPr>
             <a:r>
-              <a:rPr lang="en-US" altLang="zh-TW" dirty="0" smtClean="0">
+              <a:rPr lang="en-US" altLang="zh-TW" dirty="0">
                 <a:solidFill>
                   <a:prstClr val="white">
                     <a:lumMod val="75000"/>
@@ -8462,14 +8361,6 @@
               </a:rPr>
               <a:t>Dapper tutorial</a:t>
             </a:r>
-            <a:endParaRPr lang="en-US" altLang="zh-TW" dirty="0">
-              <a:solidFill>
-                <a:prstClr val="white">
-                  <a:lumMod val="75000"/>
-                  <a:lumOff val="25000"/>
-                </a:prstClr>
-              </a:solidFill>
-            </a:endParaRPr>
           </a:p>
           <a:p>
             <a:pPr marL="0" indent="0">
@@ -8479,15 +8370,9 @@
               <a:rPr lang="en-US" altLang="zh-TW" dirty="0">
                 <a:hlinkClick r:id="rId3"/>
               </a:rPr>
-              <a:t>http://</a:t>
-            </a:r>
-            <a:r>
-              <a:rPr lang="en-US" altLang="zh-TW" dirty="0" smtClean="0">
-                <a:hlinkClick r:id="rId3"/>
-              </a:rPr>
-              <a:t>dapper-tutorial.net/dapper</a:t>
-            </a:r>
-            <a:endParaRPr lang="en-US" altLang="zh-TW" dirty="0" smtClean="0"/>
+              <a:t>http://dapper-tutorial.net/dapper</a:t>
+            </a:r>
+            <a:endParaRPr lang="en-US" altLang="zh-TW" dirty="0"/>
           </a:p>
           <a:p>
             <a:pPr marL="0" indent="0">
@@ -8497,15 +8382,15 @@
           </a:p>
           <a:p>
             <a:r>
-              <a:rPr lang="zh-TW" altLang="en-US" dirty="0" smtClean="0"/>
+              <a:rPr lang="zh-TW" altLang="en-US" dirty="0"/>
               <a:t>為什麼 </a:t>
             </a:r>
             <a:r>
-              <a:rPr lang="en-US" altLang="zh-TW" dirty="0" smtClean="0"/>
+              <a:rPr lang="en-US" altLang="zh-TW" dirty="0"/>
               <a:t>Dapper </a:t>
             </a:r>
             <a:r>
-              <a:rPr lang="zh-TW" altLang="en-US" dirty="0" smtClean="0"/>
+              <a:rPr lang="zh-TW" altLang="en-US" dirty="0"/>
               <a:t>效能高</a:t>
             </a:r>
             <a:endParaRPr lang="en-US" altLang="zh-TW" dirty="0"/>
@@ -8579,7 +8464,7 @@
           <a:lstStyle/>
           <a:p>
             <a:r>
-              <a:rPr lang="en-US" altLang="zh-TW" dirty="0" smtClean="0"/>
+              <a:rPr lang="en-US" altLang="zh-TW" dirty="0"/>
               <a:t>Agenda</a:t>
             </a:r>
             <a:endParaRPr lang="zh-TW" altLang="en-US" dirty="0"/>
@@ -8602,66 +8487,66 @@
           <a:lstStyle/>
           <a:p>
             <a:r>
-              <a:rPr lang="en-US" altLang="zh-TW" dirty="0" smtClean="0"/>
+              <a:rPr lang="en-US" altLang="zh-TW" dirty="0"/>
               <a:t>What is Dapper</a:t>
             </a:r>
           </a:p>
           <a:p>
             <a:r>
-              <a:rPr lang="en-US" altLang="zh-TW" dirty="0" smtClean="0"/>
+              <a:rPr lang="en-US" altLang="zh-TW" dirty="0"/>
               <a:t>Why Dapper</a:t>
             </a:r>
           </a:p>
           <a:p>
             <a:r>
-              <a:rPr lang="en-US" altLang="zh-TW" dirty="0" smtClean="0"/>
+              <a:rPr lang="en-US" altLang="zh-TW" dirty="0"/>
               <a:t>Sample Code</a:t>
             </a:r>
           </a:p>
           <a:p>
             <a:pPr lvl="1"/>
             <a:r>
-              <a:rPr lang="en-US" altLang="zh-TW" dirty="0" smtClean="0"/>
+              <a:rPr lang="en-US" altLang="zh-TW" dirty="0"/>
               <a:t>Query</a:t>
             </a:r>
           </a:p>
           <a:p>
             <a:pPr lvl="1"/>
             <a:r>
-              <a:rPr lang="en-US" altLang="zh-TW" dirty="0" smtClean="0"/>
+              <a:rPr lang="en-US" altLang="zh-TW" dirty="0"/>
               <a:t>CRUD</a:t>
             </a:r>
           </a:p>
           <a:p>
             <a:r>
-              <a:rPr lang="en-US" altLang="zh-TW" dirty="0" err="1" smtClean="0"/>
+              <a:rPr lang="en-US" altLang="zh-TW" dirty="0" err="1"/>
               <a:t>Dapper.Contrib</a:t>
             </a:r>
-            <a:endParaRPr lang="en-US" altLang="zh-TW" dirty="0" smtClean="0"/>
+            <a:endParaRPr lang="en-US" altLang="zh-TW" dirty="0"/>
           </a:p>
           <a:p>
             <a:pPr lvl="1"/>
             <a:r>
-              <a:rPr lang="en-US" altLang="zh-TW" dirty="0" smtClean="0"/>
+              <a:rPr lang="en-US" altLang="zh-TW" dirty="0"/>
               <a:t>Attributes</a:t>
             </a:r>
           </a:p>
           <a:p>
             <a:pPr lvl="1"/>
             <a:r>
-              <a:rPr lang="en-US" altLang="zh-TW" dirty="0" smtClean="0"/>
+              <a:rPr lang="en-US" altLang="zh-TW" dirty="0"/>
               <a:t>Assumptions</a:t>
             </a:r>
           </a:p>
           <a:p>
             <a:r>
-              <a:rPr lang="en-US" altLang="zh-TW" dirty="0" smtClean="0"/>
+              <a:rPr lang="en-US" altLang="zh-TW" dirty="0"/>
               <a:t>Benchmark with EF Core</a:t>
             </a:r>
           </a:p>
           <a:p>
             <a:r>
-              <a:rPr lang="en-US" altLang="zh-TW" dirty="0" smtClean="0"/>
+              <a:rPr lang="en-US" altLang="zh-TW" dirty="0"/>
               <a:t>Reference</a:t>
             </a:r>
             <a:endParaRPr lang="zh-TW" altLang="en-US" dirty="0"/>
@@ -8714,7 +8599,7 @@
           <a:lstStyle/>
           <a:p>
             <a:r>
-              <a:rPr lang="en-US" altLang="zh-TW" dirty="0" smtClean="0"/>
+              <a:rPr lang="en-US" altLang="zh-TW" dirty="0"/>
               <a:t>What is Dapper</a:t>
             </a:r>
             <a:endParaRPr lang="zh-TW" altLang="en-US" dirty="0"/>
@@ -8739,51 +8624,43 @@
           <a:lstStyle/>
           <a:p>
             <a:r>
-              <a:rPr lang="zh-TW" altLang="en-US" sz="2400" dirty="0" smtClean="0"/>
-              <a:t>簡單</a:t>
-            </a:r>
-            <a:r>
               <a:rPr lang="zh-TW" altLang="en-US" sz="2400" dirty="0"/>
-              <a:t>、</a:t>
-            </a:r>
-            <a:r>
-              <a:rPr lang="zh-TW" altLang="en-US" sz="2400" dirty="0" smtClean="0"/>
-              <a:t>快速、輕量化的 </a:t>
-            </a:r>
-            <a:r>
-              <a:rPr lang="en-US" altLang="zh-TW" sz="2400" dirty="0" smtClean="0"/>
+              <a:t>簡單、快速、輕量化的 </a:t>
+            </a:r>
+            <a:r>
+              <a:rPr lang="en-US" altLang="zh-TW" sz="2400" dirty="0"/>
               <a:t>ORM Library</a:t>
             </a:r>
           </a:p>
           <a:p>
             <a:r>
-              <a:rPr lang="zh-TW" altLang="en-US" sz="2400" dirty="0" smtClean="0"/>
+              <a:rPr lang="zh-TW" altLang="en-US" sz="2400" dirty="0"/>
               <a:t>直接擴充於 </a:t>
             </a:r>
             <a:r>
-              <a:rPr lang="en-US" altLang="zh-TW" sz="2400" dirty="0" err="1" smtClean="0"/>
+              <a:rPr lang="en-US" altLang="zh-TW" sz="2400" dirty="0" err="1"/>
               <a:t>ADO.Net</a:t>
             </a:r>
             <a:r>
-              <a:rPr lang="en-US" altLang="zh-TW" sz="2400" dirty="0" smtClean="0"/>
+              <a:rPr lang="en-US" altLang="zh-TW" sz="2400" dirty="0"/>
               <a:t> </a:t>
             </a:r>
             <a:r>
-              <a:rPr lang="zh-TW" altLang="en-US" sz="2400" dirty="0" smtClean="0"/>
+              <a:rPr lang="zh-TW" altLang="en-US" sz="2400" dirty="0"/>
               <a:t>的</a:t>
             </a:r>
             <a:r>
-              <a:rPr lang="en-US" altLang="zh-TW" sz="2400" dirty="0" smtClean="0"/>
+              <a:rPr lang="en-US" altLang="zh-TW" sz="2400" dirty="0"/>
               <a:t>API</a:t>
             </a:r>
           </a:p>
           <a:p>
             <a:r>
-              <a:rPr lang="zh-TW" altLang="en-US" sz="2400" dirty="0" smtClean="0"/>
+              <a:rPr lang="zh-TW" altLang="en-US" sz="2400" dirty="0"/>
               <a:t>支援各種</a:t>
             </a:r>
             <a:r>
-              <a:rPr lang="en-US" altLang="zh-TW" sz="2400" dirty="0" smtClean="0"/>
+              <a:rPr lang="en-US" altLang="zh-TW" sz="2400" dirty="0"/>
               <a:t> Database</a:t>
             </a:r>
           </a:p>
@@ -8791,10 +8668,10 @@
             <a:pPr marL="0" indent="0">
               <a:buNone/>
             </a:pPr>
-            <a:endParaRPr lang="en-US" altLang="zh-TW" sz="2400" dirty="0" smtClean="0"/>
-          </a:p>
-          <a:p>
-            <a:endParaRPr lang="en-US" altLang="zh-TW" sz="2400" dirty="0" smtClean="0"/>
+            <a:endParaRPr lang="en-US" altLang="zh-TW" sz="2400" dirty="0"/>
+          </a:p>
+          <a:p>
+            <a:endParaRPr lang="en-US" altLang="zh-TW" sz="2400" dirty="0"/>
           </a:p>
         </p:txBody>
       </p:sp>
@@ -8951,7 +8828,7 @@
           <a:lstStyle/>
           <a:p>
             <a:r>
-              <a:rPr lang="en-US" altLang="zh-TW" dirty="0" smtClean="0"/>
+              <a:rPr lang="en-US" altLang="zh-TW" dirty="0"/>
               <a:t>Why Dapper</a:t>
             </a:r>
             <a:endParaRPr lang="zh-TW" altLang="en-US" dirty="0"/>
@@ -9238,10 +9115,9 @@
           <a:lstStyle/>
           <a:p>
             <a:r>
-              <a:rPr lang="en-US" altLang="zh-TW" dirty="0" smtClean="0"/>
+              <a:rPr lang="en-US" altLang="zh-TW" dirty="0"/>
               <a:t>Entity Framework overview</a:t>
             </a:r>
-            <a:endParaRPr lang="en-US" altLang="zh-TW" dirty="0"/>
           </a:p>
         </p:txBody>
       </p:sp>
@@ -9255,13 +9131,6 @@
   <p:clrMapOvr>
     <a:masterClrMapping/>
   </p:clrMapOvr>
-  <p:timing>
-    <p:tnLst>
-      <p:par>
-        <p:cTn id="1" dur="indefinite" restart="never" nodeType="tmRoot"/>
-      </p:par>
-    </p:tnLst>
-  </p:timing>
 </p:sld>
 </file>
 
@@ -9321,72 +9190,68 @@
           <a:lstStyle/>
           <a:p>
             <a:r>
-              <a:rPr lang="zh-TW" altLang="en-US" dirty="0" smtClean="0"/>
+              <a:rPr lang="zh-TW" altLang="en-US" dirty="0"/>
               <a:t>優點</a:t>
             </a:r>
-            <a:endParaRPr lang="en-US" altLang="zh-TW" dirty="0" smtClean="0"/>
+            <a:endParaRPr lang="en-US" altLang="zh-TW" dirty="0"/>
           </a:p>
           <a:p>
             <a:pPr lvl="1"/>
             <a:r>
-              <a:rPr lang="zh-TW" altLang="en-US" dirty="0" smtClean="0"/>
+              <a:rPr lang="zh-TW" altLang="en-US" dirty="0"/>
               <a:t>容易監控與調校</a:t>
             </a:r>
             <a:r>
-              <a:rPr lang="en-US" altLang="zh-TW" dirty="0" smtClean="0"/>
+              <a:rPr lang="en-US" altLang="zh-TW" dirty="0"/>
               <a:t> SQL command </a:t>
             </a:r>
             <a:r>
-              <a:rPr lang="zh-TW" altLang="en-US" dirty="0" smtClean="0"/>
+              <a:rPr lang="zh-TW" altLang="en-US" dirty="0"/>
               <a:t>效能</a:t>
             </a:r>
-            <a:endParaRPr lang="en-US" altLang="zh-TW" dirty="0" smtClean="0"/>
+            <a:endParaRPr lang="en-US" altLang="zh-TW" dirty="0"/>
           </a:p>
           <a:p>
             <a:pPr lvl="1"/>
             <a:r>
-              <a:rPr lang="zh-TW" altLang="en-US" dirty="0" smtClean="0"/>
+              <a:rPr lang="zh-TW" altLang="en-US" dirty="0"/>
               <a:t>輕量化，不須維護 </a:t>
             </a:r>
             <a:r>
-              <a:rPr lang="en-US" altLang="zh-TW" dirty="0" smtClean="0"/>
+              <a:rPr lang="en-US" altLang="zh-TW" dirty="0"/>
               <a:t>Mapping </a:t>
             </a:r>
             <a:r>
-              <a:rPr lang="zh-TW" altLang="en-US" dirty="0" smtClean="0"/>
+              <a:rPr lang="zh-TW" altLang="en-US" dirty="0"/>
               <a:t>設定檔</a:t>
             </a:r>
-            <a:endParaRPr lang="en-US" altLang="zh-TW" dirty="0" smtClean="0"/>
+            <a:endParaRPr lang="en-US" altLang="zh-TW" dirty="0"/>
           </a:p>
           <a:p>
             <a:pPr lvl="1"/>
             <a:r>
-              <a:rPr lang="zh-TW" altLang="en-US" dirty="0" smtClean="0"/>
+              <a:rPr lang="zh-TW" altLang="en-US" dirty="0"/>
               <a:t>使用 </a:t>
             </a:r>
             <a:r>
-              <a:rPr lang="en-US" altLang="zh-TW" dirty="0" smtClean="0"/>
+              <a:rPr lang="en-US" altLang="zh-TW" dirty="0"/>
               <a:t>Emit </a:t>
             </a:r>
             <a:r>
-              <a:rPr lang="zh-TW" altLang="en-US" dirty="0" smtClean="0"/>
+              <a:rPr lang="zh-TW" altLang="en-US" dirty="0"/>
               <a:t>及 </a:t>
             </a:r>
             <a:r>
-              <a:rPr lang="en-US" altLang="zh-TW" dirty="0" smtClean="0"/>
+              <a:rPr lang="en-US" altLang="zh-TW" dirty="0"/>
               <a:t>Cache </a:t>
             </a:r>
             <a:r>
-              <a:rPr lang="zh-TW" altLang="en-US" dirty="0" smtClean="0"/>
+              <a:rPr lang="zh-TW" altLang="en-US" dirty="0"/>
               <a:t>機制實作</a:t>
             </a:r>
             <a:r>
-              <a:rPr lang="en-US" altLang="zh-TW" dirty="0" smtClean="0"/>
-              <a:t> </a:t>
-            </a:r>
-            <a:r>
-              <a:rPr lang="en-US" altLang="zh-TW" dirty="0"/>
-              <a:t>(</a:t>
+              <a:rPr lang="en-US" altLang="zh-TW" dirty="0"/>
+              <a:t> (</a:t>
             </a:r>
             <a:r>
               <a:rPr lang="en-US" altLang="zh-TW" dirty="0" err="1"/>
@@ -9398,26 +9263,22 @@
             </a:r>
             <a:r>
               <a:rPr lang="zh-TW" altLang="en-US" dirty="0"/>
-              <a:t>加快反射</a:t>
-            </a:r>
-            <a:r>
-              <a:rPr lang="zh-TW" altLang="en-US" dirty="0" smtClean="0"/>
-              <a:t>速度，效能較佳</a:t>
-            </a:r>
-            <a:endParaRPr lang="en-US" altLang="zh-TW" dirty="0" smtClean="0"/>
+              <a:t>加快反射速度，效能較佳</a:t>
+            </a:r>
+            <a:endParaRPr lang="en-US" altLang="zh-TW" dirty="0"/>
           </a:p>
           <a:p>
             <a:pPr lvl="1"/>
             <a:r>
-              <a:rPr lang="zh-TW" altLang="en-US" dirty="0" smtClean="0"/>
+              <a:rPr lang="zh-TW" altLang="en-US" dirty="0"/>
               <a:t>支援</a:t>
             </a:r>
             <a:r>
-              <a:rPr lang="en-US" altLang="zh-TW" dirty="0" smtClean="0"/>
+              <a:rPr lang="en-US" altLang="zh-TW" dirty="0"/>
               <a:t> CRUD </a:t>
             </a:r>
             <a:r>
-              <a:rPr lang="zh-TW" altLang="en-US" dirty="0" smtClean="0"/>
+              <a:rPr lang="zh-TW" altLang="en-US" dirty="0"/>
               <a:t>操作</a:t>
             </a:r>
             <a:endParaRPr lang="en-US" altLang="zh-TW" dirty="0"/>
@@ -9425,14 +9286,14 @@
           <a:p>
             <a:pPr lvl="1"/>
             <a:r>
-              <a:rPr lang="zh-TW" altLang="en-US" dirty="0" smtClean="0"/>
+              <a:rPr lang="zh-TW" altLang="en-US" dirty="0"/>
               <a:t>支援 </a:t>
             </a:r>
             <a:r>
-              <a:rPr lang="en-US" altLang="zh-TW" dirty="0" err="1" smtClean="0"/>
+              <a:rPr lang="en-US" altLang="zh-TW" dirty="0" err="1"/>
               <a:t>async</a:t>
             </a:r>
-            <a:endParaRPr lang="en-US" altLang="zh-TW" dirty="0" smtClean="0"/>
+            <a:endParaRPr lang="en-US" altLang="zh-TW" dirty="0"/>
           </a:p>
         </p:txBody>
       </p:sp>
@@ -9446,13 +9307,6 @@
   <p:clrMapOvr>
     <a:masterClrMapping/>
   </p:clrMapOvr>
-  <p:timing>
-    <p:tnLst>
-      <p:par>
-        <p:cTn id="1" dur="indefinite" restart="never" nodeType="tmRoot"/>
-      </p:par>
-    </p:tnLst>
-  </p:timing>
 </p:sld>
 </file>
 
@@ -9517,20 +9371,16 @@
           <a:lstStyle/>
           <a:p>
             <a:r>
-              <a:rPr lang="zh-TW" altLang="en-US" dirty="0" smtClean="0"/>
+              <a:rPr lang="zh-TW" altLang="en-US" dirty="0"/>
               <a:t>缺點 </a:t>
             </a:r>
-            <a:endParaRPr lang="en-US" altLang="zh-TW" dirty="0" smtClean="0"/>
+            <a:endParaRPr lang="en-US" altLang="zh-TW" dirty="0"/>
           </a:p>
           <a:p>
             <a:pPr lvl="1"/>
             <a:r>
-              <a:rPr lang="zh-TW" altLang="en-US" dirty="0" smtClean="0"/>
-              <a:t>無法</a:t>
-            </a:r>
-            <a:r>
               <a:rPr lang="zh-TW" altLang="en-US" dirty="0"/>
-              <a:t>直接使用</a:t>
+              <a:t>無法直接使用</a:t>
             </a:r>
             <a:r>
               <a:rPr lang="en-US" altLang="zh-TW" dirty="0"/>
@@ -9548,129 +9398,120 @@
               <a:rPr lang="zh-TW" altLang="en-US" dirty="0"/>
               <a:t>對資料庫查詢</a:t>
             </a:r>
-            <a:endParaRPr lang="en-US" altLang="zh-TW" dirty="0" smtClean="0"/>
+            <a:endParaRPr lang="en-US" altLang="zh-TW" dirty="0"/>
           </a:p>
           <a:p>
             <a:pPr lvl="1"/>
             <a:r>
-              <a:rPr lang="zh-TW" altLang="en-US" dirty="0" smtClean="0"/>
+              <a:rPr lang="zh-TW" altLang="en-US" dirty="0"/>
               <a:t>需要自行處理 </a:t>
             </a:r>
             <a:r>
-              <a:rPr lang="en-US" altLang="zh-TW" dirty="0" smtClean="0"/>
+              <a:rPr lang="en-US" altLang="zh-TW" dirty="0"/>
               <a:t>Entity</a:t>
             </a:r>
             <a:r>
-              <a:rPr lang="zh-TW" altLang="en-US" dirty="0" smtClean="0"/>
+              <a:rPr lang="zh-TW" altLang="en-US" dirty="0"/>
               <a:t> 之間的關係 </a:t>
             </a:r>
             <a:r>
-              <a:rPr lang="en-US" altLang="zh-TW" dirty="0" smtClean="0"/>
+              <a:rPr lang="en-US" altLang="zh-TW" dirty="0"/>
               <a:t>( 1:1, 1:n)</a:t>
             </a:r>
           </a:p>
           <a:p>
             <a:pPr lvl="1"/>
             <a:r>
-              <a:rPr lang="en-US" altLang="zh-TW" dirty="0" err="1" smtClean="0"/>
+              <a:rPr lang="en-US" altLang="zh-TW" dirty="0" err="1"/>
               <a:t>Dapper.Contrib</a:t>
             </a:r>
             <a:r>
-              <a:rPr lang="en-US" altLang="zh-TW" dirty="0" smtClean="0"/>
+              <a:rPr lang="en-US" altLang="zh-TW" dirty="0"/>
               <a:t> </a:t>
             </a:r>
             <a:r>
-              <a:rPr lang="zh-TW" altLang="en-US" dirty="0" smtClean="0"/>
+              <a:rPr lang="zh-TW" altLang="en-US" dirty="0"/>
               <a:t>相關</a:t>
             </a:r>
             <a:r>
-              <a:rPr lang="en-US" altLang="zh-TW" dirty="0" smtClean="0"/>
+              <a:rPr lang="en-US" altLang="zh-TW" dirty="0"/>
               <a:t>:</a:t>
             </a:r>
+          </a:p>
+          <a:p>
+            <a:pPr lvl="2"/>
+            <a:r>
+              <a:rPr lang="zh-TW" altLang="en-US" dirty="0"/>
+              <a:t>無法判斷出</a:t>
+            </a:r>
+            <a:r>
+              <a:rPr lang="en-US" altLang="zh-TW" dirty="0"/>
+              <a:t> Entity object </a:t>
+            </a:r>
+            <a:r>
+              <a:rPr lang="zh-TW" altLang="en-US" dirty="0"/>
+              <a:t>有異動的屬性</a:t>
+            </a:r>
             <a:endParaRPr lang="en-US" altLang="zh-TW" dirty="0"/>
           </a:p>
           <a:p>
             <a:pPr lvl="2"/>
             <a:r>
-              <a:rPr lang="zh-TW" altLang="en-US" dirty="0" smtClean="0"/>
-              <a:t>無法判斷出</a:t>
-            </a:r>
-            <a:r>
-              <a:rPr lang="en-US" altLang="zh-TW" dirty="0" smtClean="0"/>
-              <a:t> Entity object </a:t>
-            </a:r>
-            <a:r>
-              <a:rPr lang="zh-TW" altLang="en-US" dirty="0" smtClean="0"/>
-              <a:t>有異動的屬性</a:t>
-            </a:r>
-            <a:endParaRPr lang="en-US" altLang="zh-TW" dirty="0" smtClean="0"/>
+              <a:rPr lang="zh-TW" altLang="en-US" dirty="0"/>
+              <a:t>無法自動在寫入資料庫前進行欄位值驗證</a:t>
+            </a:r>
+            <a:endParaRPr lang="en-US" altLang="zh-TW" dirty="0"/>
           </a:p>
           <a:p>
             <a:pPr lvl="2"/>
             <a:r>
-              <a:rPr lang="zh-TW" altLang="en-US" dirty="0" smtClean="0"/>
-              <a:t>無法自動在寫入資料庫前進行欄位值驗證</a:t>
-            </a:r>
-            <a:endParaRPr lang="en-US" altLang="zh-TW" dirty="0" smtClean="0"/>
+              <a:rPr lang="zh-TW" altLang="en-US" dirty="0"/>
+              <a:t>無法動態指定要更新的 </a:t>
+            </a:r>
+            <a:r>
+              <a:rPr lang="en-US" altLang="zh-TW" dirty="0"/>
+              <a:t>Table Columns</a:t>
+            </a:r>
           </a:p>
           <a:p>
             <a:pPr lvl="2"/>
             <a:r>
-              <a:rPr lang="zh-TW" altLang="en-US" dirty="0" smtClean="0"/>
-              <a:t>無法</a:t>
+              <a:rPr lang="en-US" altLang="zh-TW" dirty="0"/>
+              <a:t>Get()</a:t>
             </a:r>
             <a:r>
               <a:rPr lang="zh-TW" altLang="en-US" dirty="0"/>
-              <a:t>動態</a:t>
-            </a:r>
-            <a:r>
-              <a:rPr lang="zh-TW" altLang="en-US" dirty="0" smtClean="0"/>
-              <a:t>指定要更新的 </a:t>
-            </a:r>
-            <a:r>
-              <a:rPr lang="en-US" altLang="zh-TW" dirty="0" smtClean="0"/>
-              <a:t>Table Columns</a:t>
-            </a:r>
-          </a:p>
-          <a:p>
-            <a:pPr lvl="2"/>
-            <a:r>
-              <a:rPr lang="en-US" altLang="zh-TW" dirty="0" smtClean="0"/>
-              <a:t>Get()</a:t>
-            </a:r>
-            <a:r>
-              <a:rPr lang="zh-TW" altLang="en-US" dirty="0" smtClean="0"/>
               <a:t> 及</a:t>
             </a:r>
             <a:r>
-              <a:rPr lang="en-US" altLang="zh-TW" dirty="0" smtClean="0"/>
+              <a:rPr lang="en-US" altLang="zh-TW" dirty="0"/>
               <a:t> </a:t>
             </a:r>
             <a:r>
-              <a:rPr lang="en-US" altLang="zh-TW" dirty="0" err="1" smtClean="0"/>
+              <a:rPr lang="en-US" altLang="zh-TW" dirty="0" err="1"/>
               <a:t>GetAll</a:t>
             </a:r>
             <a:r>
-              <a:rPr lang="en-US" altLang="zh-TW" dirty="0" smtClean="0"/>
+              <a:rPr lang="en-US" altLang="zh-TW" dirty="0"/>
               <a:t>()</a:t>
             </a:r>
             <a:r>
-              <a:rPr lang="zh-TW" altLang="en-US" dirty="0" smtClean="0"/>
+              <a:rPr lang="zh-TW" altLang="en-US" dirty="0"/>
               <a:t> 方法僅支援單一 </a:t>
             </a:r>
             <a:r>
-              <a:rPr lang="en-US" altLang="zh-TW" dirty="0" smtClean="0"/>
+              <a:rPr lang="en-US" altLang="zh-TW" dirty="0"/>
               <a:t>PK </a:t>
             </a:r>
             <a:r>
-              <a:rPr lang="zh-TW" altLang="en-US" dirty="0" smtClean="0"/>
+              <a:rPr lang="zh-TW" altLang="en-US" dirty="0"/>
               <a:t>欄位</a:t>
             </a:r>
-            <a:endParaRPr lang="en-US" altLang="zh-TW" dirty="0" smtClean="0"/>
+            <a:endParaRPr lang="en-US" altLang="zh-TW" dirty="0"/>
           </a:p>
           <a:p>
             <a:pPr lvl="1"/>
-            <a:endParaRPr lang="en-US" altLang="zh-TW" dirty="0" smtClean="0"/>
+            <a:endParaRPr lang="en-US" altLang="zh-TW" dirty="0"/>
           </a:p>
         </p:txBody>
       </p:sp>
@@ -9684,13 +9525,6 @@
   <p:clrMapOvr>
     <a:masterClrMapping/>
   </p:clrMapOvr>
-  <p:timing>
-    <p:tnLst>
-      <p:par>
-        <p:cTn id="1" dur="indefinite" restart="never" nodeType="tmRoot"/>
-      </p:par>
-    </p:tnLst>
-  </p:timing>
 </p:sld>
 </file>
 
@@ -9727,7 +9561,7 @@
           <a:lstStyle/>
           <a:p>
             <a:r>
-              <a:rPr lang="en-US" altLang="zh-TW" dirty="0" smtClean="0"/>
+              <a:rPr lang="en-US" altLang="zh-TW" dirty="0"/>
               <a:t>Sample Code</a:t>
             </a:r>
             <a:endParaRPr lang="zh-TW" altLang="en-US" dirty="0"/>
@@ -9752,149 +9586,122 @@
           <a:lstStyle/>
           <a:p>
             <a:r>
-              <a:rPr lang="en-US" altLang="zh-TW" dirty="0" err="1" smtClean="0"/>
+              <a:rPr lang="en-US" altLang="zh-TW" dirty="0" err="1"/>
               <a:t>Dotnet</a:t>
             </a:r>
             <a:r>
-              <a:rPr lang="en-US" altLang="zh-TW" dirty="0" smtClean="0"/>
-              <a:t> Core 2.0 Test </a:t>
-            </a:r>
-            <a:r>
-              <a:rPr lang="en-US" altLang="zh-TW" dirty="0" smtClean="0"/>
-              <a:t>Project (Sample)</a:t>
-            </a:r>
-            <a:endParaRPr lang="en-US" altLang="zh-TW" dirty="0" smtClean="0"/>
-          </a:p>
-          <a:p>
-            <a:r>
-              <a:rPr lang="en-US" altLang="zh-TW" dirty="0" err="1" smtClean="0"/>
+              <a:rPr lang="en-US" altLang="zh-TW" dirty="0"/>
+              <a:t> Core 2.0 Test Project (Sample)</a:t>
+            </a:r>
+          </a:p>
+          <a:p>
+            <a:r>
+              <a:rPr lang="en-US" altLang="zh-TW" dirty="0" err="1"/>
               <a:t>Sql</a:t>
             </a:r>
             <a:r>
-              <a:rPr lang="en-US" altLang="zh-TW" dirty="0" smtClean="0"/>
-              <a:t> Server Database </a:t>
-            </a:r>
-            <a:r>
-              <a:rPr lang="en-US" altLang="zh-TW" dirty="0" smtClean="0"/>
-              <a:t>Project (DB schema)</a:t>
-            </a:r>
-          </a:p>
-          <a:p>
-            <a:r>
-              <a:rPr lang="en-US" altLang="zh-TW" dirty="0" err="1" smtClean="0"/>
+              <a:rPr lang="en-US" altLang="zh-TW" dirty="0"/>
+              <a:t> Server Database Project (DB schema)</a:t>
+            </a:r>
+          </a:p>
+          <a:p>
+            <a:r>
+              <a:rPr lang="en-US" altLang="zh-TW" dirty="0" err="1"/>
               <a:t>Dotnet</a:t>
             </a:r>
             <a:r>
-              <a:rPr lang="en-US" altLang="zh-TW" dirty="0" smtClean="0"/>
+              <a:rPr lang="en-US" altLang="zh-TW" dirty="0"/>
               <a:t> Core 2.0 Console Project (Benchmark)</a:t>
             </a:r>
-            <a:endParaRPr lang="en-US" altLang="zh-TW" dirty="0" smtClean="0"/>
-          </a:p>
-          <a:p>
-            <a:r>
-              <a:rPr lang="en-US" altLang="zh-TW" dirty="0" err="1" smtClean="0"/>
+          </a:p>
+          <a:p>
+            <a:r>
+              <a:rPr lang="en-US" altLang="zh-TW" dirty="0" err="1"/>
               <a:t>Nuget</a:t>
             </a:r>
             <a:r>
-              <a:rPr lang="en-US" altLang="zh-TW" dirty="0" smtClean="0"/>
+              <a:rPr lang="en-US" altLang="zh-TW" dirty="0"/>
               <a:t>:</a:t>
             </a:r>
           </a:p>
           <a:p>
             <a:pPr lvl="1"/>
             <a:r>
-              <a:rPr lang="en-US" altLang="zh-TW" dirty="0" smtClean="0"/>
+              <a:rPr lang="en-US" altLang="zh-TW" dirty="0"/>
               <a:t>Dapper (Core Lib)</a:t>
             </a:r>
           </a:p>
           <a:p>
             <a:pPr lvl="1"/>
             <a:r>
-              <a:rPr lang="en-US" altLang="zh-TW" dirty="0" err="1" smtClean="0"/>
+              <a:rPr lang="en-US" altLang="zh-TW" dirty="0" err="1"/>
               <a:t>Dapper.Contrib</a:t>
             </a:r>
             <a:r>
-              <a:rPr lang="en-US" altLang="zh-TW" dirty="0" smtClean="0"/>
+              <a:rPr lang="en-US" altLang="zh-TW" dirty="0"/>
               <a:t> (support CRUD)</a:t>
             </a:r>
           </a:p>
           <a:p>
             <a:pPr lvl="1"/>
             <a:r>
-              <a:rPr lang="en-US" altLang="zh-TW" dirty="0" err="1" smtClean="0"/>
+              <a:rPr lang="en-US" altLang="zh-TW" dirty="0" err="1"/>
               <a:t>Dapper.SqlBuilder</a:t>
             </a:r>
             <a:r>
-              <a:rPr lang="en-US" altLang="zh-TW" dirty="0" smtClean="0"/>
+              <a:rPr lang="en-US" altLang="zh-TW" dirty="0"/>
               <a:t> (support dynamic </a:t>
             </a:r>
             <a:r>
-              <a:rPr lang="en-US" altLang="zh-TW" dirty="0" err="1" smtClean="0"/>
+              <a:rPr lang="en-US" altLang="zh-TW" dirty="0" err="1"/>
               <a:t>sql</a:t>
             </a:r>
             <a:r>
               <a:rPr lang="en-US" altLang="zh-TW" dirty="0"/>
-              <a:t> </a:t>
-            </a:r>
-            <a:r>
-              <a:rPr lang="en-US" altLang="zh-TW" dirty="0" smtClean="0"/>
-              <a:t>command)</a:t>
+              <a:t> command)</a:t>
             </a:r>
           </a:p>
           <a:p>
             <a:pPr lvl="1"/>
             <a:r>
-              <a:rPr lang="en-US" altLang="zh-TW" dirty="0" err="1" smtClean="0"/>
+              <a:rPr lang="en-US" altLang="zh-TW" dirty="0" err="1"/>
               <a:t>MSTest</a:t>
             </a:r>
-            <a:endParaRPr lang="en-US" altLang="zh-TW" dirty="0" smtClean="0"/>
+            <a:endParaRPr lang="en-US" altLang="zh-TW" dirty="0"/>
           </a:p>
           <a:p>
             <a:pPr lvl="1"/>
             <a:r>
-              <a:rPr lang="en-US" altLang="zh-TW" dirty="0" err="1" smtClean="0"/>
+              <a:rPr lang="en-US" altLang="zh-TW" dirty="0" err="1"/>
               <a:t>FluentAssertions</a:t>
             </a:r>
             <a:r>
-              <a:rPr lang="en-US" altLang="zh-TW" dirty="0" smtClean="0"/>
-              <a:t> (extension of test assertions</a:t>
-            </a:r>
-            <a:r>
-              <a:rPr lang="en-US" altLang="zh-TW" dirty="0" smtClean="0"/>
-              <a:t>)</a:t>
+              <a:rPr lang="en-US" altLang="zh-TW" dirty="0"/>
+              <a:t> (extension of test assertions)</a:t>
             </a:r>
           </a:p>
           <a:p>
             <a:pPr lvl="1"/>
             <a:r>
-              <a:rPr lang="en-US" altLang="zh-TW" dirty="0" err="1" smtClean="0"/>
+              <a:rPr lang="en-US" altLang="zh-TW" dirty="0" err="1"/>
               <a:t>BenchmarkDotnet</a:t>
             </a:r>
-            <a:r>
-              <a:rPr lang="en-US" altLang="zh-TW" dirty="0" smtClean="0"/>
-              <a:t/>
-            </a:r>
             <a:br>
-              <a:rPr lang="en-US" altLang="zh-TW" dirty="0" smtClean="0"/>
+              <a:rPr lang="en-US" altLang="zh-TW" dirty="0"/>
             </a:br>
-            <a:r>
-              <a:rPr lang="en-US" altLang="zh-TW" dirty="0" smtClean="0"/>
-              <a:t/>
-            </a:r>
             <a:br>
-              <a:rPr lang="en-US" altLang="zh-TW" dirty="0" smtClean="0"/>
+              <a:rPr lang="en-US" altLang="zh-TW" dirty="0"/>
             </a:br>
-            <a:endParaRPr lang="en-US" altLang="zh-TW" dirty="0" smtClean="0"/>
+            <a:endParaRPr lang="en-US" altLang="zh-TW" dirty="0"/>
           </a:p>
           <a:p>
             <a:pPr marL="457200" lvl="1" indent="0">
               <a:buNone/>
             </a:pPr>
             <a:r>
-              <a:rPr lang="zh-TW" altLang="en-US" dirty="0" smtClean="0"/>
+              <a:rPr lang="zh-TW" altLang="en-US" dirty="0"/>
               <a:t>免責聲明：範例程式僅供參考，並非良好的單元測試結構</a:t>
             </a:r>
-            <a:endParaRPr lang="zh-TW" altLang="en-US" dirty="0"/>
           </a:p>
         </p:txBody>
       </p:sp>
@@ -9944,7 +9751,7 @@
           <a:lstStyle/>
           <a:p>
             <a:r>
-              <a:rPr lang="en-US" altLang="zh-TW" dirty="0" smtClean="0"/>
+              <a:rPr lang="en-US" altLang="zh-TW" dirty="0"/>
               <a:t>Query</a:t>
             </a:r>
             <a:endParaRPr lang="zh-TW" altLang="en-US" dirty="0"/>
@@ -9967,94 +9774,86 @@
           <a:lstStyle/>
           <a:p>
             <a:r>
-              <a:rPr lang="en-US" altLang="zh-TW" dirty="0" smtClean="0"/>
+              <a:rPr lang="en-US" altLang="zh-TW" dirty="0"/>
               <a:t>Query&lt;T&gt;</a:t>
             </a:r>
           </a:p>
           <a:p>
             <a:r>
-              <a:rPr lang="en-US" altLang="zh-TW" dirty="0" err="1" smtClean="0"/>
+              <a:rPr lang="en-US" altLang="zh-TW" dirty="0" err="1"/>
               <a:t>QueryFirst</a:t>
             </a:r>
             <a:r>
-              <a:rPr lang="en-US" altLang="zh-TW" dirty="0" smtClean="0"/>
+              <a:rPr lang="en-US" altLang="zh-TW" dirty="0"/>
               <a:t>&lt;T&gt;</a:t>
             </a:r>
           </a:p>
           <a:p>
             <a:r>
-              <a:rPr lang="en-US" altLang="zh-TW" dirty="0" smtClean="0"/>
+              <a:rPr lang="en-US" altLang="zh-TW" dirty="0"/>
               <a:t>Query with parameter</a:t>
             </a:r>
           </a:p>
           <a:p>
             <a:r>
-              <a:rPr lang="en-US" altLang="zh-TW" dirty="0" err="1" smtClean="0"/>
+              <a:rPr lang="en-US" altLang="zh-TW" dirty="0" err="1"/>
               <a:t>SqlBuilder</a:t>
             </a:r>
-            <a:endParaRPr lang="en-US" altLang="zh-TW" dirty="0" smtClean="0"/>
-          </a:p>
-          <a:p>
-            <a:r>
-              <a:rPr lang="en-US" altLang="zh-TW" dirty="0" smtClean="0"/>
+            <a:endParaRPr lang="en-US" altLang="zh-TW" dirty="0"/>
+          </a:p>
+          <a:p>
+            <a:r>
+              <a:rPr lang="en-US" altLang="zh-TW" dirty="0"/>
               <a:t>Dynamic return type</a:t>
             </a:r>
           </a:p>
           <a:p>
             <a:r>
-              <a:rPr lang="en-US" altLang="zh-TW" dirty="0" smtClean="0"/>
+              <a:rPr lang="en-US" altLang="zh-TW" dirty="0"/>
               <a:t>One to many entity (with </a:t>
             </a:r>
             <a:r>
-              <a:rPr lang="en-US" altLang="zh-TW" dirty="0" err="1" smtClean="0"/>
+              <a:rPr lang="en-US" altLang="zh-TW" dirty="0" err="1"/>
               <a:t>sql</a:t>
             </a:r>
             <a:r>
-              <a:rPr lang="en-US" altLang="zh-TW" dirty="0" smtClean="0"/>
+              <a:rPr lang="en-US" altLang="zh-TW" dirty="0"/>
               <a:t> join)</a:t>
             </a:r>
           </a:p>
           <a:p>
             <a:r>
-              <a:rPr lang="en-US" altLang="zh-TW" dirty="0" err="1" smtClean="0"/>
+              <a:rPr lang="en-US" altLang="zh-TW" dirty="0" err="1"/>
               <a:t>RowParser</a:t>
             </a:r>
             <a:r>
-              <a:rPr lang="en-US" altLang="zh-TW" dirty="0" smtClean="0"/>
-              <a:t> </a:t>
-            </a:r>
-            <a:r>
-              <a:rPr lang="en-US" altLang="zh-TW" dirty="0"/>
-              <a:t>(</a:t>
-            </a:r>
-            <a:r>
-              <a:rPr lang="en-US" altLang="zh-TW" dirty="0" smtClean="0"/>
-              <a:t>Multiple types in one </a:t>
-            </a:r>
-            <a:r>
-              <a:rPr lang="en-US" altLang="zh-TW" dirty="0" err="1" smtClean="0"/>
+              <a:rPr lang="en-US" altLang="zh-TW" dirty="0"/>
+              <a:t> (Multiple types in one </a:t>
+            </a:r>
+            <a:r>
+              <a:rPr lang="en-US" altLang="zh-TW" dirty="0" err="1"/>
               <a:t>recordset</a:t>
             </a:r>
             <a:r>
-              <a:rPr lang="en-US" altLang="zh-TW" dirty="0" smtClean="0"/>
+              <a:rPr lang="en-US" altLang="zh-TW" dirty="0"/>
               <a:t>)</a:t>
             </a:r>
           </a:p>
           <a:p>
             <a:r>
-              <a:rPr lang="en-US" altLang="zh-TW" dirty="0" err="1" smtClean="0"/>
+              <a:rPr lang="en-US" altLang="zh-TW" dirty="0" err="1"/>
               <a:t>QueryMultiple</a:t>
             </a:r>
             <a:r>
-              <a:rPr lang="en-US" altLang="zh-TW" dirty="0" smtClean="0"/>
+              <a:rPr lang="en-US" altLang="zh-TW" dirty="0"/>
               <a:t> (Multiple </a:t>
             </a:r>
             <a:r>
-              <a:rPr lang="en-US" altLang="zh-TW" dirty="0" err="1" smtClean="0"/>
+              <a:rPr lang="en-US" altLang="zh-TW" dirty="0" err="1"/>
               <a:t>recordsets</a:t>
             </a:r>
             <a:r>
-              <a:rPr lang="en-US" altLang="zh-TW" dirty="0" smtClean="0"/>
+              <a:rPr lang="en-US" altLang="zh-TW" dirty="0"/>
               <a:t>)</a:t>
             </a:r>
           </a:p>
@@ -10073,13 +9872,6 @@
   <p:clrMapOvr>
     <a:masterClrMapping/>
   </p:clrMapOvr>
-  <p:timing>
-    <p:tnLst>
-      <p:par>
-        <p:cTn id="1" dur="indefinite" restart="never" nodeType="tmRoot"/>
-      </p:par>
-    </p:tnLst>
-  </p:timing>
 </p:sld>
 </file>
 
@@ -10334,7 +10126,7 @@
   <a:extraClrSchemeLst/>
   <a:extLst>
     <a:ext uri="{05A4C25C-085E-4340-85A3-A5531E510DB2}">
-      <thm15:themeFamily xmlns:thm15="http://schemas.microsoft.com/office/thememl/2012/main" xmlns="" name="Facet" id="{C0C680CD-088A-49FC-A102-D699147F32B2}" vid="{8C59B386-999D-4CB6-B907-9F3997C027CC}"/>
+      <thm15:themeFamily xmlns:thm15="http://schemas.microsoft.com/office/thememl/2012/main" name="Facet" id="{C0C680CD-088A-49FC-A102-D699147F32B2}" vid="{8C59B386-999D-4CB6-B907-9F3997C027CC}"/>
     </a:ext>
   </a:extLst>
 </a:theme>

</xml_diff>